<commit_message>
add ppt and pdf
</commit_message>
<xml_diff>
--- a/P4_CreateReportDB/SQL Project Submission.pptx
+++ b/P4_CreateReportDB/SQL Project Submission.pptx
@@ -29,16 +29,16 @@
   <p:notesSz cx="6858000" cy="9144000"/>
   <p:embeddedFontLst>
     <p:embeddedFont>
-      <p:font typeface="等线" panose="02010600030101010101" pitchFamily="2" charset="-122"/>
+      <p:font typeface="Open Sans" panose="020B0606030504020204" pitchFamily="34" charset="0"/>
       <p:regular r:id="rId19"/>
       <p:bold r:id="rId20"/>
+      <p:italic r:id="rId21"/>
+      <p:boldItalic r:id="rId22"/>
     </p:embeddedFont>
     <p:embeddedFont>
-      <p:font typeface="Open Sans" panose="020B0606030504020204" pitchFamily="34" charset="0"/>
-      <p:regular r:id="rId21"/>
-      <p:bold r:id="rId22"/>
-      <p:italic r:id="rId23"/>
-      <p:boldItalic r:id="rId24"/>
+      <p:font typeface="等线" panose="02010600030101010101" pitchFamily="2" charset="-122"/>
+      <p:regular r:id="rId23"/>
+      <p:bold r:id="rId24"/>
     </p:embeddedFont>
   </p:embeddedFontLst>
   <p:defaultTextStyle>
@@ -243,6 +243,11 @@
       </a:defRPr>
     </a:lvl9pPr>
   </p:defaultTextStyle>
+  <p:extLst>
+    <p:ext uri="{EFAFB233-063F-42B5-8137-9DF3F51BA10A}">
+      <p15:sldGuideLst xmlns:p15="http://schemas.microsoft.com/office/powerpoint/2012/main"/>
+    </p:ext>
+  </p:extLst>
 </p:presentation>
 </file>
 
@@ -33822,296 +33827,6 @@
               <a:sym typeface="Open Sans"/>
             </a:endParaRPr>
           </a:p>
-          <a:p>
-            <a:pPr lvl="0">
-              <a:lnSpc>
-                <a:spcPct val="100000"/>
-              </a:lnSpc>
-              <a:spcAft>
-                <a:spcPts val="0"/>
-              </a:spcAft>
-            </a:pPr>
-            <a:r>
-              <a:rPr lang="en-US" dirty="0">
-                <a:latin typeface="Open Sans"/>
-                <a:ea typeface="Open Sans"/>
-                <a:cs typeface="Open Sans"/>
-                <a:sym typeface="Open Sans"/>
-              </a:rPr>
-              <a:t>SELECT </a:t>
-            </a:r>
-            <a:r>
-              <a:rPr lang="en-US" dirty="0" err="1">
-                <a:latin typeface="Open Sans"/>
-                <a:ea typeface="Open Sans"/>
-                <a:cs typeface="Open Sans"/>
-                <a:sym typeface="Open Sans"/>
-              </a:rPr>
-              <a:t>c.CompanyName</a:t>
-            </a:r>
-            <a:r>
-              <a:rPr lang="en-US" dirty="0">
-                <a:latin typeface="Open Sans"/>
-                <a:ea typeface="Open Sans"/>
-                <a:cs typeface="Open Sans"/>
-                <a:sym typeface="Open Sans"/>
-              </a:rPr>
-              <a:t>, COUNT(</a:t>
-            </a:r>
-            <a:r>
-              <a:rPr lang="en-US" dirty="0" err="1">
-                <a:latin typeface="Open Sans"/>
-                <a:ea typeface="Open Sans"/>
-                <a:cs typeface="Open Sans"/>
-                <a:sym typeface="Open Sans"/>
-              </a:rPr>
-              <a:t>o.ShipCountry</a:t>
-            </a:r>
-            <a:r>
-              <a:rPr lang="en-US" dirty="0">
-                <a:latin typeface="Open Sans"/>
-                <a:ea typeface="Open Sans"/>
-                <a:cs typeface="Open Sans"/>
-                <a:sym typeface="Open Sans"/>
-              </a:rPr>
-              <a:t>) AS </a:t>
-            </a:r>
-            <a:r>
-              <a:rPr lang="en-US" dirty="0" err="1">
-                <a:latin typeface="Open Sans"/>
-                <a:ea typeface="Open Sans"/>
-                <a:cs typeface="Open Sans"/>
-                <a:sym typeface="Open Sans"/>
-              </a:rPr>
-              <a:t>ShipCountryNum</a:t>
-            </a:r>
-            <a:endParaRPr lang="en-US" dirty="0">
-              <a:latin typeface="Open Sans"/>
-              <a:ea typeface="Open Sans"/>
-              <a:cs typeface="Open Sans"/>
-              <a:sym typeface="Open Sans"/>
-            </a:endParaRPr>
-          </a:p>
-          <a:p>
-            <a:pPr lvl="0">
-              <a:lnSpc>
-                <a:spcPct val="100000"/>
-              </a:lnSpc>
-              <a:spcAft>
-                <a:spcPts val="0"/>
-              </a:spcAft>
-            </a:pPr>
-            <a:r>
-              <a:rPr lang="en-US" dirty="0">
-                <a:latin typeface="Open Sans"/>
-                <a:ea typeface="Open Sans"/>
-                <a:cs typeface="Open Sans"/>
-                <a:sym typeface="Open Sans"/>
-              </a:rPr>
-              <a:t>FROM Customers c</a:t>
-            </a:r>
-          </a:p>
-          <a:p>
-            <a:pPr lvl="0">
-              <a:lnSpc>
-                <a:spcPct val="100000"/>
-              </a:lnSpc>
-              <a:spcAft>
-                <a:spcPts val="0"/>
-              </a:spcAft>
-            </a:pPr>
-            <a:r>
-              <a:rPr lang="en-US" dirty="0">
-                <a:latin typeface="Open Sans"/>
-                <a:ea typeface="Open Sans"/>
-                <a:cs typeface="Open Sans"/>
-                <a:sym typeface="Open Sans"/>
-              </a:rPr>
-              <a:t>JOIN Orders o</a:t>
-            </a:r>
-          </a:p>
-          <a:p>
-            <a:pPr lvl="0">
-              <a:lnSpc>
-                <a:spcPct val="100000"/>
-              </a:lnSpc>
-              <a:spcAft>
-                <a:spcPts val="0"/>
-              </a:spcAft>
-            </a:pPr>
-            <a:r>
-              <a:rPr lang="en-US" dirty="0">
-                <a:latin typeface="Open Sans"/>
-                <a:ea typeface="Open Sans"/>
-                <a:cs typeface="Open Sans"/>
-                <a:sym typeface="Open Sans"/>
-              </a:rPr>
-              <a:t>ON </a:t>
-            </a:r>
-            <a:r>
-              <a:rPr lang="en-US" dirty="0" err="1">
-                <a:latin typeface="Open Sans"/>
-                <a:ea typeface="Open Sans"/>
-                <a:cs typeface="Open Sans"/>
-                <a:sym typeface="Open Sans"/>
-              </a:rPr>
-              <a:t>c.CustomerID</a:t>
-            </a:r>
-            <a:r>
-              <a:rPr lang="en-US" dirty="0">
-                <a:latin typeface="Open Sans"/>
-                <a:ea typeface="Open Sans"/>
-                <a:cs typeface="Open Sans"/>
-                <a:sym typeface="Open Sans"/>
-              </a:rPr>
-              <a:t> = </a:t>
-            </a:r>
-            <a:r>
-              <a:rPr lang="en-US" dirty="0" err="1">
-                <a:latin typeface="Open Sans"/>
-                <a:ea typeface="Open Sans"/>
-                <a:cs typeface="Open Sans"/>
-                <a:sym typeface="Open Sans"/>
-              </a:rPr>
-              <a:t>o.CustomerID</a:t>
-            </a:r>
-            <a:endParaRPr lang="en-US" dirty="0">
-              <a:latin typeface="Open Sans"/>
-              <a:ea typeface="Open Sans"/>
-              <a:cs typeface="Open Sans"/>
-              <a:sym typeface="Open Sans"/>
-            </a:endParaRPr>
-          </a:p>
-          <a:p>
-            <a:pPr lvl="0">
-              <a:lnSpc>
-                <a:spcPct val="100000"/>
-              </a:lnSpc>
-              <a:spcAft>
-                <a:spcPts val="0"/>
-              </a:spcAft>
-            </a:pPr>
-            <a:r>
-              <a:rPr lang="en-US" dirty="0">
-                <a:latin typeface="Open Sans"/>
-                <a:ea typeface="Open Sans"/>
-                <a:cs typeface="Open Sans"/>
-                <a:sym typeface="Open Sans"/>
-              </a:rPr>
-              <a:t>GROUP BY </a:t>
-            </a:r>
-            <a:r>
-              <a:rPr lang="en-US" dirty="0" err="1">
-                <a:latin typeface="Open Sans"/>
-                <a:ea typeface="Open Sans"/>
-                <a:cs typeface="Open Sans"/>
-                <a:sym typeface="Open Sans"/>
-              </a:rPr>
-              <a:t>c.CompanyName</a:t>
-            </a:r>
-            <a:endParaRPr lang="en-US" dirty="0">
-              <a:latin typeface="Open Sans"/>
-              <a:ea typeface="Open Sans"/>
-              <a:cs typeface="Open Sans"/>
-              <a:sym typeface="Open Sans"/>
-            </a:endParaRPr>
-          </a:p>
-          <a:p>
-            <a:pPr lvl="0">
-              <a:lnSpc>
-                <a:spcPct val="100000"/>
-              </a:lnSpc>
-              <a:spcAft>
-                <a:spcPts val="0"/>
-              </a:spcAft>
-            </a:pPr>
-            <a:r>
-              <a:rPr lang="en-US" dirty="0">
-                <a:latin typeface="Open Sans"/>
-                <a:ea typeface="Open Sans"/>
-                <a:cs typeface="Open Sans"/>
-                <a:sym typeface="Open Sans"/>
-              </a:rPr>
-              <a:t>HAVING COUNT(</a:t>
-            </a:r>
-            <a:r>
-              <a:rPr lang="en-US" dirty="0" err="1">
-                <a:latin typeface="Open Sans"/>
-                <a:ea typeface="Open Sans"/>
-                <a:cs typeface="Open Sans"/>
-                <a:sym typeface="Open Sans"/>
-              </a:rPr>
-              <a:t>o.ShipCountry</a:t>
-            </a:r>
-            <a:r>
-              <a:rPr lang="en-US" dirty="0">
-                <a:latin typeface="Open Sans"/>
-                <a:ea typeface="Open Sans"/>
-                <a:cs typeface="Open Sans"/>
-                <a:sym typeface="Open Sans"/>
-              </a:rPr>
-              <a:t>) &gt; 10</a:t>
-            </a:r>
-          </a:p>
-          <a:p>
-            <a:pPr lvl="0">
-              <a:lnSpc>
-                <a:spcPct val="100000"/>
-              </a:lnSpc>
-              <a:spcAft>
-                <a:spcPts val="0"/>
-              </a:spcAft>
-            </a:pPr>
-            <a:r>
-              <a:rPr lang="en-US" dirty="0">
-                <a:latin typeface="Open Sans"/>
-                <a:ea typeface="Open Sans"/>
-                <a:cs typeface="Open Sans"/>
-                <a:sym typeface="Open Sans"/>
-              </a:rPr>
-              <a:t>ORDER BY </a:t>
-            </a:r>
-            <a:r>
-              <a:rPr lang="en-US" dirty="0" err="1">
-                <a:latin typeface="Open Sans"/>
-                <a:ea typeface="Open Sans"/>
-                <a:cs typeface="Open Sans"/>
-                <a:sym typeface="Open Sans"/>
-              </a:rPr>
-              <a:t>ShipCountryNum</a:t>
-            </a:r>
-            <a:endParaRPr lang="en-US" dirty="0">
-              <a:latin typeface="Open Sans"/>
-              <a:ea typeface="Open Sans"/>
-              <a:cs typeface="Open Sans"/>
-              <a:sym typeface="Open Sans"/>
-            </a:endParaRPr>
-          </a:p>
-          <a:p>
-            <a:pPr lvl="0">
-              <a:lnSpc>
-                <a:spcPct val="100000"/>
-              </a:lnSpc>
-              <a:spcAft>
-                <a:spcPts val="0"/>
-              </a:spcAft>
-            </a:pPr>
-            <a:r>
-              <a:rPr lang="en-US" dirty="0">
-                <a:latin typeface="Open Sans"/>
-                <a:ea typeface="Open Sans"/>
-                <a:cs typeface="Open Sans"/>
-                <a:sym typeface="Open Sans"/>
-              </a:rPr>
-              <a:t>DESC;</a:t>
-            </a:r>
-            <a:endParaRPr lang="en" dirty="0">
-              <a:latin typeface="Open Sans"/>
-              <a:ea typeface="Open Sans"/>
-              <a:cs typeface="Open Sans"/>
-              <a:sym typeface="Open Sans"/>
-            </a:endParaRPr>
-          </a:p>
         </p:txBody>
       </p:sp>
       <p:sp>
@@ -34369,205 +34084,6 @@
             </a:endParaRPr>
           </a:p>
           <a:p>
-            <a:pPr>
-              <a:lnSpc>
-                <a:spcPct val="100000"/>
-              </a:lnSpc>
-              <a:spcAft>
-                <a:spcPts val="0"/>
-              </a:spcAft>
-            </a:pPr>
-            <a:r>
-              <a:rPr lang="en-US" altLang="zh-CN" dirty="0"/>
-              <a:t>SELECT </a:t>
-            </a:r>
-            <a:r>
-              <a:rPr lang="en-US" altLang="zh-CN" dirty="0" err="1"/>
-              <a:t>p.ProductName</a:t>
-            </a:r>
-            <a:r>
-              <a:rPr lang="en-US" altLang="zh-CN" dirty="0"/>
-              <a:t>, STRFTIME('%Y-%m', </a:t>
-            </a:r>
-            <a:r>
-              <a:rPr lang="en-US" altLang="zh-CN" dirty="0" err="1"/>
-              <a:t>o.OrderDate</a:t>
-            </a:r>
-            <a:r>
-              <a:rPr lang="en-US" altLang="zh-CN" dirty="0"/>
-              <a:t>) AS </a:t>
-            </a:r>
-            <a:r>
-              <a:rPr lang="en-US" altLang="zh-CN" dirty="0" err="1"/>
-              <a:t>OrderMonth</a:t>
-            </a:r>
-            <a:r>
-              <a:rPr lang="en-US" altLang="zh-CN" dirty="0"/>
-              <a:t>, SUM(</a:t>
-            </a:r>
-            <a:r>
-              <a:rPr lang="en-US" altLang="zh-CN" dirty="0" err="1"/>
-              <a:t>od.UnitPrice</a:t>
-            </a:r>
-            <a:r>
-              <a:rPr lang="en-US" altLang="zh-CN" dirty="0"/>
-              <a:t> * </a:t>
-            </a:r>
-            <a:r>
-              <a:rPr lang="en-US" altLang="zh-CN" dirty="0" err="1"/>
-              <a:t>od.Quantity</a:t>
-            </a:r>
-            <a:r>
-              <a:rPr lang="en-US" altLang="zh-CN" dirty="0"/>
-              <a:t> * (1 - </a:t>
-            </a:r>
-            <a:r>
-              <a:rPr lang="en-US" altLang="zh-CN" dirty="0" err="1"/>
-              <a:t>od.Discount</a:t>
-            </a:r>
-            <a:r>
-              <a:rPr lang="en-US" altLang="zh-CN" dirty="0"/>
-              <a:t>)) AS </a:t>
-            </a:r>
-            <a:r>
-              <a:rPr lang="en-US" altLang="zh-CN" dirty="0" err="1"/>
-              <a:t>TotalSales</a:t>
-            </a:r>
-            <a:endParaRPr lang="en-US" altLang="zh-CN" dirty="0"/>
-          </a:p>
-          <a:p>
-            <a:pPr>
-              <a:lnSpc>
-                <a:spcPct val="100000"/>
-              </a:lnSpc>
-              <a:spcAft>
-                <a:spcPts val="0"/>
-              </a:spcAft>
-            </a:pPr>
-            <a:r>
-              <a:rPr lang="en-US" altLang="zh-CN" dirty="0"/>
-              <a:t>FROM Products p</a:t>
-            </a:r>
-          </a:p>
-          <a:p>
-            <a:pPr>
-              <a:lnSpc>
-                <a:spcPct val="100000"/>
-              </a:lnSpc>
-              <a:spcAft>
-                <a:spcPts val="0"/>
-              </a:spcAft>
-            </a:pPr>
-            <a:r>
-              <a:rPr lang="en-US" altLang="zh-CN" dirty="0"/>
-              <a:t>JOIN </a:t>
-            </a:r>
-            <a:r>
-              <a:rPr lang="en-US" altLang="zh-CN" dirty="0" err="1"/>
-              <a:t>OrderDetails</a:t>
-            </a:r>
-            <a:r>
-              <a:rPr lang="en-US" altLang="zh-CN" dirty="0"/>
-              <a:t> od</a:t>
-            </a:r>
-          </a:p>
-          <a:p>
-            <a:pPr>
-              <a:lnSpc>
-                <a:spcPct val="100000"/>
-              </a:lnSpc>
-              <a:spcAft>
-                <a:spcPts val="0"/>
-              </a:spcAft>
-            </a:pPr>
-            <a:r>
-              <a:rPr lang="en-US" altLang="zh-CN" dirty="0"/>
-              <a:t>ON </a:t>
-            </a:r>
-            <a:r>
-              <a:rPr lang="en-US" altLang="zh-CN" dirty="0" err="1"/>
-              <a:t>p.ProductID</a:t>
-            </a:r>
-            <a:r>
-              <a:rPr lang="en-US" altLang="zh-CN" dirty="0"/>
-              <a:t> = </a:t>
-            </a:r>
-            <a:r>
-              <a:rPr lang="en-US" altLang="zh-CN" dirty="0" err="1"/>
-              <a:t>od.ProductID</a:t>
-            </a:r>
-            <a:endParaRPr lang="en-US" altLang="zh-CN" dirty="0"/>
-          </a:p>
-          <a:p>
-            <a:pPr>
-              <a:lnSpc>
-                <a:spcPct val="100000"/>
-              </a:lnSpc>
-              <a:spcAft>
-                <a:spcPts val="0"/>
-              </a:spcAft>
-            </a:pPr>
-            <a:r>
-              <a:rPr lang="en-US" altLang="zh-CN" dirty="0"/>
-              <a:t>JOIN Orders o</a:t>
-            </a:r>
-          </a:p>
-          <a:p>
-            <a:pPr>
-              <a:lnSpc>
-                <a:spcPct val="100000"/>
-              </a:lnSpc>
-              <a:spcAft>
-                <a:spcPts val="0"/>
-              </a:spcAft>
-            </a:pPr>
-            <a:r>
-              <a:rPr lang="en-US" altLang="zh-CN" dirty="0"/>
-              <a:t>ON </a:t>
-            </a:r>
-            <a:r>
-              <a:rPr lang="en-US" altLang="zh-CN" dirty="0" err="1"/>
-              <a:t>od.OrderID</a:t>
-            </a:r>
-            <a:r>
-              <a:rPr lang="en-US" altLang="zh-CN" dirty="0"/>
-              <a:t> = </a:t>
-            </a:r>
-            <a:r>
-              <a:rPr lang="en-US" altLang="zh-CN" dirty="0" err="1"/>
-              <a:t>o.OrderId</a:t>
-            </a:r>
-            <a:endParaRPr lang="en-US" altLang="zh-CN" dirty="0"/>
-          </a:p>
-          <a:p>
-            <a:pPr>
-              <a:lnSpc>
-                <a:spcPct val="100000"/>
-              </a:lnSpc>
-              <a:spcAft>
-                <a:spcPts val="0"/>
-              </a:spcAft>
-            </a:pPr>
-            <a:r>
-              <a:rPr lang="en-US" altLang="zh-CN" dirty="0"/>
-              <a:t>GROUP BY 1, 2</a:t>
-            </a:r>
-          </a:p>
-          <a:p>
-            <a:pPr>
-              <a:lnSpc>
-                <a:spcPct val="100000"/>
-              </a:lnSpc>
-              <a:spcAft>
-                <a:spcPts val="0"/>
-              </a:spcAft>
-            </a:pPr>
-            <a:r>
-              <a:rPr lang="en-US" altLang="zh-CN" dirty="0"/>
-              <a:t>ORDER BY 1, 2</a:t>
-            </a:r>
-          </a:p>
-          <a:p>
             <a:pPr lvl="0" rtl="0">
               <a:spcBef>
                 <a:spcPts val="0"/>
@@ -34813,401 +34329,6 @@
               <a:cs typeface="Open Sans"/>
               <a:sym typeface="Open Sans"/>
             </a:endParaRPr>
-          </a:p>
-          <a:p>
-            <a:pPr>
-              <a:lnSpc>
-                <a:spcPct val="100000"/>
-              </a:lnSpc>
-              <a:spcAft>
-                <a:spcPts val="0"/>
-              </a:spcAft>
-            </a:pPr>
-            <a:r>
-              <a:rPr lang="en-US" altLang="zh-CN" dirty="0" err="1"/>
-              <a:t>WIth</a:t>
-            </a:r>
-            <a:r>
-              <a:rPr lang="en-US" altLang="zh-CN" dirty="0"/>
-              <a:t> </a:t>
-            </a:r>
-            <a:r>
-              <a:rPr lang="en-US" altLang="zh-CN" dirty="0" err="1"/>
-              <a:t>TopProducts</a:t>
-            </a:r>
-            <a:r>
-              <a:rPr lang="en-US" altLang="zh-CN" dirty="0"/>
-              <a:t> AS (SELECT </a:t>
-            </a:r>
-            <a:r>
-              <a:rPr lang="en-US" altLang="zh-CN" dirty="0" err="1"/>
-              <a:t>ProductID</a:t>
-            </a:r>
-            <a:r>
-              <a:rPr lang="en-US" altLang="zh-CN" dirty="0"/>
-              <a:t> FROM (SELECT </a:t>
-            </a:r>
-            <a:r>
-              <a:rPr lang="en-US" altLang="zh-CN" dirty="0" err="1"/>
-              <a:t>p.ProductID</a:t>
-            </a:r>
-            <a:r>
-              <a:rPr lang="en-US" altLang="zh-CN" dirty="0"/>
-              <a:t>, COUNT(*) AS </a:t>
-            </a:r>
-            <a:r>
-              <a:rPr lang="en-US" altLang="zh-CN" dirty="0" err="1"/>
-              <a:t>ProductNum</a:t>
-            </a:r>
-            <a:endParaRPr lang="en-US" altLang="zh-CN" dirty="0"/>
-          </a:p>
-          <a:p>
-            <a:pPr>
-              <a:lnSpc>
-                <a:spcPct val="100000"/>
-              </a:lnSpc>
-              <a:spcAft>
-                <a:spcPts val="0"/>
-              </a:spcAft>
-            </a:pPr>
-            <a:r>
-              <a:rPr lang="en-US" altLang="zh-CN" dirty="0"/>
-              <a:t>FROM Orders o</a:t>
-            </a:r>
-          </a:p>
-          <a:p>
-            <a:pPr>
-              <a:lnSpc>
-                <a:spcPct val="100000"/>
-              </a:lnSpc>
-              <a:spcAft>
-                <a:spcPts val="0"/>
-              </a:spcAft>
-            </a:pPr>
-            <a:r>
-              <a:rPr lang="en-US" altLang="zh-CN" dirty="0"/>
-              <a:t>JOIN </a:t>
-            </a:r>
-            <a:r>
-              <a:rPr lang="en-US" altLang="zh-CN" dirty="0" err="1"/>
-              <a:t>OrderDetails</a:t>
-            </a:r>
-            <a:r>
-              <a:rPr lang="en-US" altLang="zh-CN" dirty="0"/>
-              <a:t> od</a:t>
-            </a:r>
-          </a:p>
-          <a:p>
-            <a:pPr>
-              <a:lnSpc>
-                <a:spcPct val="100000"/>
-              </a:lnSpc>
-              <a:spcAft>
-                <a:spcPts val="0"/>
-              </a:spcAft>
-            </a:pPr>
-            <a:r>
-              <a:rPr lang="en-US" altLang="zh-CN" dirty="0"/>
-              <a:t>ON </a:t>
-            </a:r>
-            <a:r>
-              <a:rPr lang="en-US" altLang="zh-CN" dirty="0" err="1"/>
-              <a:t>o.OrderId</a:t>
-            </a:r>
-            <a:r>
-              <a:rPr lang="en-US" altLang="zh-CN" dirty="0"/>
-              <a:t> = </a:t>
-            </a:r>
-            <a:r>
-              <a:rPr lang="en-US" altLang="zh-CN" dirty="0" err="1"/>
-              <a:t>od.OrderID</a:t>
-            </a:r>
-            <a:endParaRPr lang="en-US" altLang="zh-CN" dirty="0"/>
-          </a:p>
-          <a:p>
-            <a:pPr>
-              <a:lnSpc>
-                <a:spcPct val="100000"/>
-              </a:lnSpc>
-              <a:spcAft>
-                <a:spcPts val="0"/>
-              </a:spcAft>
-            </a:pPr>
-            <a:r>
-              <a:rPr lang="en-US" altLang="zh-CN" dirty="0"/>
-              <a:t>JOIN Products p</a:t>
-            </a:r>
-          </a:p>
-          <a:p>
-            <a:pPr>
-              <a:lnSpc>
-                <a:spcPct val="100000"/>
-              </a:lnSpc>
-              <a:spcAft>
-                <a:spcPts val="0"/>
-              </a:spcAft>
-            </a:pPr>
-            <a:r>
-              <a:rPr lang="en-US" altLang="zh-CN" dirty="0"/>
-              <a:t>ON </a:t>
-            </a:r>
-            <a:r>
-              <a:rPr lang="en-US" altLang="zh-CN" dirty="0" err="1"/>
-              <a:t>od.ProductID</a:t>
-            </a:r>
-            <a:r>
-              <a:rPr lang="en-US" altLang="zh-CN" dirty="0"/>
-              <a:t> = </a:t>
-            </a:r>
-            <a:r>
-              <a:rPr lang="en-US" altLang="zh-CN" dirty="0" err="1"/>
-              <a:t>p.ProductID</a:t>
-            </a:r>
-            <a:endParaRPr lang="en-US" altLang="zh-CN" dirty="0"/>
-          </a:p>
-          <a:p>
-            <a:pPr>
-              <a:lnSpc>
-                <a:spcPct val="100000"/>
-              </a:lnSpc>
-              <a:spcAft>
-                <a:spcPts val="0"/>
-              </a:spcAft>
-            </a:pPr>
-            <a:r>
-              <a:rPr lang="en-US" altLang="zh-CN" dirty="0"/>
-              <a:t>GROUP BY </a:t>
-            </a:r>
-            <a:r>
-              <a:rPr lang="en-US" altLang="zh-CN" dirty="0" err="1"/>
-              <a:t>p.ProductID</a:t>
-            </a:r>
-            <a:endParaRPr lang="en-US" altLang="zh-CN" dirty="0"/>
-          </a:p>
-          <a:p>
-            <a:pPr>
-              <a:lnSpc>
-                <a:spcPct val="100000"/>
-              </a:lnSpc>
-              <a:spcAft>
-                <a:spcPts val="0"/>
-              </a:spcAft>
-            </a:pPr>
-            <a:r>
-              <a:rPr lang="en-US" altLang="zh-CN" dirty="0"/>
-              <a:t>ORDER BY </a:t>
-            </a:r>
-            <a:r>
-              <a:rPr lang="en-US" altLang="zh-CN" dirty="0" err="1"/>
-              <a:t>ProductNum</a:t>
-            </a:r>
-            <a:r>
-              <a:rPr lang="en-US" altLang="zh-CN" dirty="0"/>
-              <a:t> </a:t>
-            </a:r>
-          </a:p>
-          <a:p>
-            <a:pPr>
-              <a:lnSpc>
-                <a:spcPct val="100000"/>
-              </a:lnSpc>
-              <a:spcAft>
-                <a:spcPts val="0"/>
-              </a:spcAft>
-            </a:pPr>
-            <a:r>
-              <a:rPr lang="en-US" altLang="zh-CN" dirty="0"/>
-              <a:t>DESC </a:t>
-            </a:r>
-          </a:p>
-          <a:p>
-            <a:pPr>
-              <a:lnSpc>
-                <a:spcPct val="100000"/>
-              </a:lnSpc>
-              <a:spcAft>
-                <a:spcPts val="0"/>
-              </a:spcAft>
-            </a:pPr>
-            <a:r>
-              <a:rPr lang="en-US" altLang="zh-CN" dirty="0"/>
-              <a:t>LIMIT 10) sub)</a:t>
-            </a:r>
-          </a:p>
-          <a:p>
-            <a:pPr>
-              <a:lnSpc>
-                <a:spcPct val="100000"/>
-              </a:lnSpc>
-              <a:spcAft>
-                <a:spcPts val="0"/>
-              </a:spcAft>
-            </a:pPr>
-            <a:br>
-              <a:rPr lang="en-US" altLang="zh-CN" dirty="0"/>
-            </a:br>
-            <a:r>
-              <a:rPr lang="en-US" altLang="zh-CN" dirty="0"/>
-              <a:t>SELECT </a:t>
-            </a:r>
-            <a:r>
-              <a:rPr lang="en-US" altLang="zh-CN" dirty="0" err="1"/>
-              <a:t>p.ProductName</a:t>
-            </a:r>
-            <a:r>
-              <a:rPr lang="en-US" altLang="zh-CN" dirty="0"/>
-              <a:t>, COUNT(*) AS </a:t>
-            </a:r>
-            <a:r>
-              <a:rPr lang="en-US" altLang="zh-CN" dirty="0" err="1"/>
-              <a:t>SupplierNum</a:t>
-            </a:r>
-            <a:endParaRPr lang="en-US" altLang="zh-CN" dirty="0"/>
-          </a:p>
-          <a:p>
-            <a:pPr>
-              <a:lnSpc>
-                <a:spcPct val="100000"/>
-              </a:lnSpc>
-              <a:spcAft>
-                <a:spcPts val="0"/>
-              </a:spcAft>
-            </a:pPr>
-            <a:r>
-              <a:rPr lang="en-US" altLang="zh-CN" dirty="0"/>
-              <a:t>FROM Products p</a:t>
-            </a:r>
-          </a:p>
-          <a:p>
-            <a:pPr>
-              <a:lnSpc>
-                <a:spcPct val="100000"/>
-              </a:lnSpc>
-              <a:spcAft>
-                <a:spcPts val="0"/>
-              </a:spcAft>
-            </a:pPr>
-            <a:r>
-              <a:rPr lang="en-US" altLang="zh-CN" dirty="0"/>
-              <a:t>JOIN Suppliers s</a:t>
-            </a:r>
-          </a:p>
-          <a:p>
-            <a:pPr>
-              <a:lnSpc>
-                <a:spcPct val="100000"/>
-              </a:lnSpc>
-              <a:spcAft>
-                <a:spcPts val="0"/>
-              </a:spcAft>
-            </a:pPr>
-            <a:r>
-              <a:rPr lang="en-US" altLang="zh-CN" dirty="0"/>
-              <a:t>ON </a:t>
-            </a:r>
-            <a:r>
-              <a:rPr lang="en-US" altLang="zh-CN" dirty="0" err="1"/>
-              <a:t>p.SupplierID</a:t>
-            </a:r>
-            <a:r>
-              <a:rPr lang="en-US" altLang="zh-CN" dirty="0"/>
-              <a:t> = </a:t>
-            </a:r>
-            <a:r>
-              <a:rPr lang="en-US" altLang="zh-CN" dirty="0" err="1"/>
-              <a:t>s.SupplierID</a:t>
-            </a:r>
-            <a:endParaRPr lang="en-US" altLang="zh-CN" dirty="0"/>
-          </a:p>
-          <a:p>
-            <a:pPr>
-              <a:lnSpc>
-                <a:spcPct val="100000"/>
-              </a:lnSpc>
-              <a:spcAft>
-                <a:spcPts val="0"/>
-              </a:spcAft>
-            </a:pPr>
-            <a:r>
-              <a:rPr lang="en-US" altLang="zh-CN" dirty="0"/>
-              <a:t>JOIN </a:t>
-            </a:r>
-            <a:r>
-              <a:rPr lang="en-US" altLang="zh-CN" dirty="0" err="1"/>
-              <a:t>TopProducts</a:t>
-            </a:r>
-            <a:r>
-              <a:rPr lang="en-US" altLang="zh-CN" dirty="0"/>
-              <a:t> t</a:t>
-            </a:r>
-          </a:p>
-          <a:p>
-            <a:pPr>
-              <a:lnSpc>
-                <a:spcPct val="100000"/>
-              </a:lnSpc>
-              <a:spcAft>
-                <a:spcPts val="0"/>
-              </a:spcAft>
-            </a:pPr>
-            <a:r>
-              <a:rPr lang="en-US" altLang="zh-CN" dirty="0"/>
-              <a:t>ON </a:t>
-            </a:r>
-            <a:r>
-              <a:rPr lang="en-US" altLang="zh-CN" dirty="0" err="1"/>
-              <a:t>t.ProductID</a:t>
-            </a:r>
-            <a:r>
-              <a:rPr lang="en-US" altLang="zh-CN" dirty="0"/>
-              <a:t> = </a:t>
-            </a:r>
-            <a:r>
-              <a:rPr lang="en-US" altLang="zh-CN" dirty="0" err="1"/>
-              <a:t>p.ProductID</a:t>
-            </a:r>
-            <a:endParaRPr lang="en-US" altLang="zh-CN" dirty="0"/>
-          </a:p>
-          <a:p>
-            <a:pPr>
-              <a:lnSpc>
-                <a:spcPct val="100000"/>
-              </a:lnSpc>
-              <a:spcAft>
-                <a:spcPts val="0"/>
-              </a:spcAft>
-            </a:pPr>
-            <a:r>
-              <a:rPr lang="en-US" altLang="zh-CN" dirty="0"/>
-              <a:t>GROUP BY </a:t>
-            </a:r>
-            <a:r>
-              <a:rPr lang="en-US" altLang="zh-CN" dirty="0" err="1"/>
-              <a:t>p.ProductName</a:t>
-            </a:r>
-            <a:endParaRPr lang="en-US" altLang="zh-CN" dirty="0"/>
-          </a:p>
-          <a:p>
-            <a:pPr>
-              <a:lnSpc>
-                <a:spcPct val="100000"/>
-              </a:lnSpc>
-              <a:spcAft>
-                <a:spcPts val="0"/>
-              </a:spcAft>
-            </a:pPr>
-            <a:r>
-              <a:rPr lang="en-US" altLang="zh-CN" dirty="0"/>
-              <a:t>ORDER BY </a:t>
-            </a:r>
-            <a:r>
-              <a:rPr lang="en-US" altLang="zh-CN" dirty="0" err="1"/>
-              <a:t>SupplierNum</a:t>
-            </a:r>
-            <a:r>
-              <a:rPr lang="en-US" altLang="zh-CN" dirty="0"/>
-              <a:t>;</a:t>
-            </a:r>
           </a:p>
           <a:p>
             <a:pPr lvl="0" rtl="0">
@@ -35527,116 +34648,6 @@
             </a:endParaRPr>
           </a:p>
           <a:p>
-            <a:pPr>
-              <a:lnSpc>
-                <a:spcPct val="100000"/>
-              </a:lnSpc>
-              <a:spcAft>
-                <a:spcPts val="0"/>
-              </a:spcAft>
-            </a:pPr>
-            <a:r>
-              <a:rPr lang="en-US" altLang="zh-CN" dirty="0"/>
-              <a:t>SELECT </a:t>
-            </a:r>
-            <a:r>
-              <a:rPr lang="en-US" altLang="zh-CN" dirty="0" err="1"/>
-              <a:t>c.CategoryName</a:t>
-            </a:r>
-            <a:r>
-              <a:rPr lang="en-US" altLang="zh-CN" dirty="0"/>
-              <a:t>, COUNT(*) AS </a:t>
-            </a:r>
-            <a:r>
-              <a:rPr lang="en-US" altLang="zh-CN" dirty="0" err="1"/>
-              <a:t>ProductNum</a:t>
-            </a:r>
-            <a:endParaRPr lang="en-US" altLang="zh-CN" dirty="0"/>
-          </a:p>
-          <a:p>
-            <a:pPr>
-              <a:lnSpc>
-                <a:spcPct val="100000"/>
-              </a:lnSpc>
-              <a:spcAft>
-                <a:spcPts val="0"/>
-              </a:spcAft>
-            </a:pPr>
-            <a:r>
-              <a:rPr lang="en-US" altLang="zh-CN" dirty="0"/>
-              <a:t>FROM Categories c</a:t>
-            </a:r>
-          </a:p>
-          <a:p>
-            <a:pPr>
-              <a:lnSpc>
-                <a:spcPct val="100000"/>
-              </a:lnSpc>
-              <a:spcAft>
-                <a:spcPts val="0"/>
-              </a:spcAft>
-            </a:pPr>
-            <a:r>
-              <a:rPr lang="en-US" altLang="zh-CN" dirty="0"/>
-              <a:t>JOIN Products p</a:t>
-            </a:r>
-          </a:p>
-          <a:p>
-            <a:pPr>
-              <a:lnSpc>
-                <a:spcPct val="100000"/>
-              </a:lnSpc>
-              <a:spcAft>
-                <a:spcPts val="0"/>
-              </a:spcAft>
-            </a:pPr>
-            <a:r>
-              <a:rPr lang="en-US" altLang="zh-CN" dirty="0"/>
-              <a:t>ON </a:t>
-            </a:r>
-            <a:r>
-              <a:rPr lang="en-US" altLang="zh-CN" dirty="0" err="1"/>
-              <a:t>c.CategoryID</a:t>
-            </a:r>
-            <a:r>
-              <a:rPr lang="en-US" altLang="zh-CN" dirty="0"/>
-              <a:t> = </a:t>
-            </a:r>
-            <a:r>
-              <a:rPr lang="en-US" altLang="zh-CN" dirty="0" err="1"/>
-              <a:t>p.CategoryID</a:t>
-            </a:r>
-            <a:endParaRPr lang="en-US" altLang="zh-CN" dirty="0"/>
-          </a:p>
-          <a:p>
-            <a:pPr>
-              <a:lnSpc>
-                <a:spcPct val="100000"/>
-              </a:lnSpc>
-              <a:spcAft>
-                <a:spcPts val="0"/>
-              </a:spcAft>
-            </a:pPr>
-            <a:r>
-              <a:rPr lang="en-US" altLang="zh-CN" dirty="0"/>
-              <a:t>GROUP BY 1</a:t>
-            </a:r>
-          </a:p>
-          <a:p>
-            <a:pPr>
-              <a:lnSpc>
-                <a:spcPct val="100000"/>
-              </a:lnSpc>
-              <a:spcAft>
-                <a:spcPts val="0"/>
-              </a:spcAft>
-            </a:pPr>
-            <a:r>
-              <a:rPr lang="en-US" altLang="zh-CN" dirty="0"/>
-              <a:t>ORDER BY 2 DESC;</a:t>
-            </a:r>
-          </a:p>
-          <a:p>
             <a:pPr lvl="0" rtl="0">
               <a:spcBef>
                 <a:spcPts val="0"/>
@@ -35902,228 +34913,6 @@
             </a:endParaRPr>
           </a:p>
           <a:p>
-            <a:pPr>
-              <a:lnSpc>
-                <a:spcPct val="100000"/>
-              </a:lnSpc>
-              <a:spcAft>
-                <a:spcPts val="0"/>
-              </a:spcAft>
-            </a:pPr>
-            <a:r>
-              <a:rPr lang="en-US" altLang="zh-CN" dirty="0"/>
-              <a:t>SELECT PRINTF('%s %s', </a:t>
-            </a:r>
-            <a:r>
-              <a:rPr lang="en-US" altLang="zh-CN" dirty="0" err="1"/>
-              <a:t>e.FirstName</a:t>
-            </a:r>
-            <a:r>
-              <a:rPr lang="en-US" altLang="zh-CN" dirty="0"/>
-              <a:t>, </a:t>
-            </a:r>
-            <a:r>
-              <a:rPr lang="en-US" altLang="zh-CN" dirty="0" err="1"/>
-              <a:t>e.LastName</a:t>
-            </a:r>
-            <a:r>
-              <a:rPr lang="en-US" altLang="zh-CN" dirty="0"/>
-              <a:t>) AS Name, SUM(</a:t>
-            </a:r>
-            <a:r>
-              <a:rPr lang="en-US" altLang="zh-CN" dirty="0" err="1"/>
-              <a:t>od.UnitPrice</a:t>
-            </a:r>
-            <a:r>
-              <a:rPr lang="en-US" altLang="zh-CN" dirty="0"/>
-              <a:t> * </a:t>
-            </a:r>
-            <a:r>
-              <a:rPr lang="en-US" altLang="zh-CN" dirty="0" err="1"/>
-              <a:t>od.Quantity</a:t>
-            </a:r>
-            <a:r>
-              <a:rPr lang="en-US" altLang="zh-CN" dirty="0"/>
-              <a:t> * (1 - </a:t>
-            </a:r>
-            <a:r>
-              <a:rPr lang="en-US" altLang="zh-CN" dirty="0" err="1"/>
-              <a:t>od.Discount</a:t>
-            </a:r>
-            <a:r>
-              <a:rPr lang="en-US" altLang="zh-CN" dirty="0"/>
-              <a:t>)) AS </a:t>
-            </a:r>
-            <a:r>
-              <a:rPr lang="en-US" altLang="zh-CN" dirty="0" err="1"/>
-              <a:t>TotalSales</a:t>
-            </a:r>
-            <a:r>
-              <a:rPr lang="en-US" altLang="zh-CN" dirty="0"/>
-              <a:t> </a:t>
-            </a:r>
-          </a:p>
-          <a:p>
-            <a:pPr>
-              <a:lnSpc>
-                <a:spcPct val="100000"/>
-              </a:lnSpc>
-              <a:spcAft>
-                <a:spcPts val="0"/>
-              </a:spcAft>
-            </a:pPr>
-            <a:r>
-              <a:rPr lang="en-US" altLang="zh-CN" dirty="0"/>
-              <a:t>FROM Employees e</a:t>
-            </a:r>
-          </a:p>
-          <a:p>
-            <a:pPr>
-              <a:lnSpc>
-                <a:spcPct val="100000"/>
-              </a:lnSpc>
-              <a:spcAft>
-                <a:spcPts val="0"/>
-              </a:spcAft>
-            </a:pPr>
-            <a:r>
-              <a:rPr lang="en-US" altLang="zh-CN" dirty="0"/>
-              <a:t>JOIN Orders o</a:t>
-            </a:r>
-          </a:p>
-          <a:p>
-            <a:pPr>
-              <a:lnSpc>
-                <a:spcPct val="100000"/>
-              </a:lnSpc>
-              <a:spcAft>
-                <a:spcPts val="0"/>
-              </a:spcAft>
-            </a:pPr>
-            <a:r>
-              <a:rPr lang="en-US" altLang="zh-CN" dirty="0"/>
-              <a:t>ON </a:t>
-            </a:r>
-            <a:r>
-              <a:rPr lang="en-US" altLang="zh-CN" dirty="0" err="1"/>
-              <a:t>o.EmployeeID</a:t>
-            </a:r>
-            <a:r>
-              <a:rPr lang="en-US" altLang="zh-CN" dirty="0"/>
-              <a:t> = </a:t>
-            </a:r>
-            <a:r>
-              <a:rPr lang="en-US" altLang="zh-CN" dirty="0" err="1"/>
-              <a:t>e.EmployeeID</a:t>
-            </a:r>
-            <a:endParaRPr lang="en-US" altLang="zh-CN" dirty="0"/>
-          </a:p>
-          <a:p>
-            <a:pPr>
-              <a:lnSpc>
-                <a:spcPct val="100000"/>
-              </a:lnSpc>
-              <a:spcAft>
-                <a:spcPts val="0"/>
-              </a:spcAft>
-            </a:pPr>
-            <a:r>
-              <a:rPr lang="en-US" altLang="zh-CN" dirty="0"/>
-              <a:t>JOIN </a:t>
-            </a:r>
-            <a:r>
-              <a:rPr lang="en-US" altLang="zh-CN" dirty="0" err="1"/>
-              <a:t>OrderDetails</a:t>
-            </a:r>
-            <a:r>
-              <a:rPr lang="en-US" altLang="zh-CN" dirty="0"/>
-              <a:t> od</a:t>
-            </a:r>
-          </a:p>
-          <a:p>
-            <a:pPr>
-              <a:lnSpc>
-                <a:spcPct val="100000"/>
-              </a:lnSpc>
-              <a:spcAft>
-                <a:spcPts val="0"/>
-              </a:spcAft>
-            </a:pPr>
-            <a:r>
-              <a:rPr lang="en-US" altLang="zh-CN" dirty="0"/>
-              <a:t>ON </a:t>
-            </a:r>
-            <a:r>
-              <a:rPr lang="en-US" altLang="zh-CN" dirty="0" err="1"/>
-              <a:t>od.OrderID</a:t>
-            </a:r>
-            <a:r>
-              <a:rPr lang="en-US" altLang="zh-CN" dirty="0"/>
-              <a:t> = </a:t>
-            </a:r>
-            <a:r>
-              <a:rPr lang="en-US" altLang="zh-CN" dirty="0" err="1"/>
-              <a:t>o.OrderId</a:t>
-            </a:r>
-            <a:endParaRPr lang="en-US" altLang="zh-CN" dirty="0"/>
-          </a:p>
-          <a:p>
-            <a:pPr>
-              <a:lnSpc>
-                <a:spcPct val="100000"/>
-              </a:lnSpc>
-              <a:spcAft>
-                <a:spcPts val="0"/>
-              </a:spcAft>
-            </a:pPr>
-            <a:r>
-              <a:rPr lang="en-US" altLang="zh-CN" dirty="0"/>
-              <a:t>GROUP BY 1</a:t>
-            </a:r>
-          </a:p>
-          <a:p>
-            <a:pPr>
-              <a:lnSpc>
-                <a:spcPct val="100000"/>
-              </a:lnSpc>
-              <a:spcAft>
-                <a:spcPts val="0"/>
-              </a:spcAft>
-            </a:pPr>
-            <a:r>
-              <a:rPr lang="en-US" altLang="zh-CN" dirty="0"/>
-              <a:t>ORDER BY 2</a:t>
-            </a:r>
-          </a:p>
-          <a:p>
-            <a:pPr>
-              <a:lnSpc>
-                <a:spcPct val="100000"/>
-              </a:lnSpc>
-              <a:spcAft>
-                <a:spcPts val="0"/>
-              </a:spcAft>
-            </a:pPr>
-            <a:r>
-              <a:rPr lang="en-US" altLang="zh-CN" dirty="0"/>
-              <a:t>DESC</a:t>
-            </a:r>
-          </a:p>
-          <a:p>
-            <a:pPr>
-              <a:lnSpc>
-                <a:spcPct val="100000"/>
-              </a:lnSpc>
-              <a:spcAft>
-                <a:spcPts val="0"/>
-              </a:spcAft>
-            </a:pPr>
-            <a:r>
-              <a:rPr lang="en-US" altLang="zh-CN" dirty="0"/>
-              <a:t>LIMIT 1;</a:t>
-            </a:r>
-          </a:p>
-          <a:p>
             <a:pPr lvl="0" rtl="0">
               <a:spcBef>
                 <a:spcPts val="0"/>
@@ -36351,280 +35140,6 @@
               <a:cs typeface="Open Sans"/>
               <a:sym typeface="Open Sans"/>
             </a:endParaRPr>
-          </a:p>
-          <a:p>
-            <a:pPr>
-              <a:lnSpc>
-                <a:spcPct val="100000"/>
-              </a:lnSpc>
-              <a:spcAft>
-                <a:spcPts val="0"/>
-              </a:spcAft>
-            </a:pPr>
-            <a:r>
-              <a:rPr lang="en-US" altLang="zh-CN" dirty="0"/>
-              <a:t>SELECT </a:t>
-            </a:r>
-            <a:r>
-              <a:rPr lang="en-US" altLang="zh-CN" dirty="0" err="1"/>
-              <a:t>EmployeeID</a:t>
-            </a:r>
-            <a:r>
-              <a:rPr lang="en-US" altLang="zh-CN" dirty="0"/>
-              <a:t>, PRINTF('%s %s', FirstName, </a:t>
-            </a:r>
-            <a:r>
-              <a:rPr lang="en-US" altLang="zh-CN" dirty="0" err="1"/>
-              <a:t>LastName</a:t>
-            </a:r>
-            <a:r>
-              <a:rPr lang="en-US" altLang="zh-CN" dirty="0"/>
-              <a:t>) AS Name, Country</a:t>
-            </a:r>
-          </a:p>
-          <a:p>
-            <a:pPr>
-              <a:lnSpc>
-                <a:spcPct val="100000"/>
-              </a:lnSpc>
-              <a:spcAft>
-                <a:spcPts val="0"/>
-              </a:spcAft>
-            </a:pPr>
-            <a:r>
-              <a:rPr lang="en-US" altLang="zh-CN" dirty="0"/>
-              <a:t>FROM Employees</a:t>
-            </a:r>
-          </a:p>
-          <a:p>
-            <a:pPr>
-              <a:lnSpc>
-                <a:spcPct val="100000"/>
-              </a:lnSpc>
-              <a:spcAft>
-                <a:spcPts val="0"/>
-              </a:spcAft>
-            </a:pPr>
-            <a:r>
-              <a:rPr lang="en-US" altLang="zh-CN" dirty="0"/>
-              <a:t>WHERE </a:t>
-            </a:r>
-            <a:r>
-              <a:rPr lang="en-US" altLang="zh-CN" dirty="0" err="1"/>
-              <a:t>EmployeeID</a:t>
-            </a:r>
-            <a:r>
-              <a:rPr lang="en-US" altLang="zh-CN" dirty="0"/>
-              <a:t> = (SELECT </a:t>
-            </a:r>
-            <a:r>
-              <a:rPr lang="en-US" altLang="zh-CN" dirty="0" err="1"/>
-              <a:t>EmployeeID</a:t>
-            </a:r>
-            <a:r>
-              <a:rPr lang="en-US" altLang="zh-CN" dirty="0"/>
-              <a:t> FROM (SELECT </a:t>
-            </a:r>
-            <a:r>
-              <a:rPr lang="en-US" altLang="zh-CN" dirty="0" err="1"/>
-              <a:t>e.EmployeeID</a:t>
-            </a:r>
-            <a:r>
-              <a:rPr lang="en-US" altLang="zh-CN" dirty="0"/>
-              <a:t>, SUM(</a:t>
-            </a:r>
-            <a:r>
-              <a:rPr lang="en-US" altLang="zh-CN" dirty="0" err="1"/>
-              <a:t>od.UnitPrice</a:t>
-            </a:r>
-            <a:r>
-              <a:rPr lang="en-US" altLang="zh-CN" dirty="0"/>
-              <a:t> * </a:t>
-            </a:r>
-            <a:r>
-              <a:rPr lang="en-US" altLang="zh-CN" dirty="0" err="1"/>
-              <a:t>od.Quantity</a:t>
-            </a:r>
-            <a:r>
-              <a:rPr lang="en-US" altLang="zh-CN" dirty="0"/>
-              <a:t> * (1 - </a:t>
-            </a:r>
-            <a:r>
-              <a:rPr lang="en-US" altLang="zh-CN" dirty="0" err="1"/>
-              <a:t>od.Discount</a:t>
-            </a:r>
-            <a:r>
-              <a:rPr lang="en-US" altLang="zh-CN" dirty="0"/>
-              <a:t>)) AS </a:t>
-            </a:r>
-            <a:r>
-              <a:rPr lang="en-US" altLang="zh-CN" dirty="0" err="1"/>
-              <a:t>TotalSales</a:t>
-            </a:r>
-            <a:r>
-              <a:rPr lang="en-US" altLang="zh-CN" dirty="0"/>
-              <a:t> </a:t>
-            </a:r>
-          </a:p>
-          <a:p>
-            <a:pPr>
-              <a:lnSpc>
-                <a:spcPct val="100000"/>
-              </a:lnSpc>
-              <a:spcAft>
-                <a:spcPts val="0"/>
-              </a:spcAft>
-            </a:pPr>
-            <a:r>
-              <a:rPr lang="en-US" altLang="zh-CN" dirty="0"/>
-              <a:t>FROM Employees e</a:t>
-            </a:r>
-          </a:p>
-          <a:p>
-            <a:pPr>
-              <a:lnSpc>
-                <a:spcPct val="100000"/>
-              </a:lnSpc>
-              <a:spcAft>
-                <a:spcPts val="0"/>
-              </a:spcAft>
-            </a:pPr>
-            <a:r>
-              <a:rPr lang="en-US" altLang="zh-CN" dirty="0"/>
-              <a:t>JOIN Orders o</a:t>
-            </a:r>
-          </a:p>
-          <a:p>
-            <a:pPr>
-              <a:lnSpc>
-                <a:spcPct val="100000"/>
-              </a:lnSpc>
-              <a:spcAft>
-                <a:spcPts val="0"/>
-              </a:spcAft>
-            </a:pPr>
-            <a:r>
-              <a:rPr lang="en-US" altLang="zh-CN" dirty="0"/>
-              <a:t>ON </a:t>
-            </a:r>
-            <a:r>
-              <a:rPr lang="en-US" altLang="zh-CN" dirty="0" err="1"/>
-              <a:t>o.EmployeeID</a:t>
-            </a:r>
-            <a:r>
-              <a:rPr lang="en-US" altLang="zh-CN" dirty="0"/>
-              <a:t> = </a:t>
-            </a:r>
-            <a:r>
-              <a:rPr lang="en-US" altLang="zh-CN" dirty="0" err="1"/>
-              <a:t>e.EmployeeID</a:t>
-            </a:r>
-            <a:endParaRPr lang="en-US" altLang="zh-CN" dirty="0"/>
-          </a:p>
-          <a:p>
-            <a:pPr>
-              <a:lnSpc>
-                <a:spcPct val="100000"/>
-              </a:lnSpc>
-              <a:spcAft>
-                <a:spcPts val="0"/>
-              </a:spcAft>
-            </a:pPr>
-            <a:r>
-              <a:rPr lang="en-US" altLang="zh-CN" dirty="0"/>
-              <a:t>JOIN </a:t>
-            </a:r>
-            <a:r>
-              <a:rPr lang="en-US" altLang="zh-CN" dirty="0" err="1"/>
-              <a:t>OrderDetails</a:t>
-            </a:r>
-            <a:r>
-              <a:rPr lang="en-US" altLang="zh-CN" dirty="0"/>
-              <a:t> od</a:t>
-            </a:r>
-          </a:p>
-          <a:p>
-            <a:pPr>
-              <a:lnSpc>
-                <a:spcPct val="100000"/>
-              </a:lnSpc>
-              <a:spcAft>
-                <a:spcPts val="0"/>
-              </a:spcAft>
-            </a:pPr>
-            <a:r>
-              <a:rPr lang="en-US" altLang="zh-CN" dirty="0"/>
-              <a:t>ON </a:t>
-            </a:r>
-            <a:r>
-              <a:rPr lang="en-US" altLang="zh-CN" dirty="0" err="1"/>
-              <a:t>od.OrderID</a:t>
-            </a:r>
-            <a:r>
-              <a:rPr lang="en-US" altLang="zh-CN" dirty="0"/>
-              <a:t> = </a:t>
-            </a:r>
-            <a:r>
-              <a:rPr lang="en-US" altLang="zh-CN" dirty="0" err="1"/>
-              <a:t>o.OrderId</a:t>
-            </a:r>
-            <a:endParaRPr lang="en-US" altLang="zh-CN" dirty="0"/>
-          </a:p>
-          <a:p>
-            <a:pPr>
-              <a:lnSpc>
-                <a:spcPct val="100000"/>
-              </a:lnSpc>
-              <a:spcAft>
-                <a:spcPts val="0"/>
-              </a:spcAft>
-            </a:pPr>
-            <a:r>
-              <a:rPr lang="en-US" altLang="zh-CN" dirty="0"/>
-              <a:t>GROUP BY 1</a:t>
-            </a:r>
-          </a:p>
-          <a:p>
-            <a:pPr>
-              <a:lnSpc>
-                <a:spcPct val="100000"/>
-              </a:lnSpc>
-              <a:spcAft>
-                <a:spcPts val="0"/>
-              </a:spcAft>
-            </a:pPr>
-            <a:r>
-              <a:rPr lang="en-US" altLang="zh-CN" dirty="0"/>
-              <a:t>ORDER BY 2</a:t>
-            </a:r>
-          </a:p>
-          <a:p>
-            <a:pPr>
-              <a:lnSpc>
-                <a:spcPct val="100000"/>
-              </a:lnSpc>
-              <a:spcAft>
-                <a:spcPts val="0"/>
-              </a:spcAft>
-            </a:pPr>
-            <a:r>
-              <a:rPr lang="en-US" altLang="zh-CN" dirty="0"/>
-              <a:t>DESC</a:t>
-            </a:r>
-          </a:p>
-          <a:p>
-            <a:pPr>
-              <a:lnSpc>
-                <a:spcPct val="100000"/>
-              </a:lnSpc>
-              <a:spcAft>
-                <a:spcPts val="0"/>
-              </a:spcAft>
-            </a:pPr>
-            <a:r>
-              <a:rPr lang="en-US" altLang="zh-CN" dirty="0"/>
-              <a:t>LIMIT 1) t1)</a:t>
-            </a:r>
           </a:p>
           <a:p>
             <a:pPr lvl="0" rtl="0">
@@ -37095,450 +35610,6 @@
             </a:endParaRPr>
           </a:p>
           <a:p>
-            <a:pPr>
-              <a:lnSpc>
-                <a:spcPct val="100000"/>
-              </a:lnSpc>
-              <a:spcAft>
-                <a:spcPts val="0"/>
-              </a:spcAft>
-            </a:pPr>
-            <a:r>
-              <a:rPr lang="en-US" altLang="zh-CN" dirty="0"/>
-              <a:t>SELECT </a:t>
-            </a:r>
-            <a:r>
-              <a:rPr lang="en-US" altLang="zh-CN" dirty="0" err="1"/>
-              <a:t>c.CategoryName</a:t>
-            </a:r>
-            <a:r>
-              <a:rPr lang="en-US" altLang="zh-CN" dirty="0"/>
-              <a:t>, COUNT(*) AS </a:t>
-            </a:r>
-            <a:r>
-              <a:rPr lang="en-US" altLang="zh-CN" dirty="0" err="1"/>
-              <a:t>ProductNum</a:t>
-            </a:r>
-            <a:endParaRPr lang="en-US" altLang="zh-CN" dirty="0"/>
-          </a:p>
-          <a:p>
-            <a:pPr>
-              <a:lnSpc>
-                <a:spcPct val="100000"/>
-              </a:lnSpc>
-              <a:spcAft>
-                <a:spcPts val="0"/>
-              </a:spcAft>
-            </a:pPr>
-            <a:r>
-              <a:rPr lang="en-US" altLang="zh-CN" dirty="0"/>
-              <a:t>FROM Categories c</a:t>
-            </a:r>
-          </a:p>
-          <a:p>
-            <a:pPr>
-              <a:lnSpc>
-                <a:spcPct val="100000"/>
-              </a:lnSpc>
-              <a:spcAft>
-                <a:spcPts val="0"/>
-              </a:spcAft>
-            </a:pPr>
-            <a:r>
-              <a:rPr lang="en-US" altLang="zh-CN" dirty="0"/>
-              <a:t>JOIN Products p</a:t>
-            </a:r>
-          </a:p>
-          <a:p>
-            <a:pPr>
-              <a:lnSpc>
-                <a:spcPct val="100000"/>
-              </a:lnSpc>
-              <a:spcAft>
-                <a:spcPts val="0"/>
-              </a:spcAft>
-            </a:pPr>
-            <a:r>
-              <a:rPr lang="en-US" altLang="zh-CN" dirty="0"/>
-              <a:t>ON </a:t>
-            </a:r>
-            <a:r>
-              <a:rPr lang="en-US" altLang="zh-CN" dirty="0" err="1"/>
-              <a:t>c.CategoryID</a:t>
-            </a:r>
-            <a:r>
-              <a:rPr lang="en-US" altLang="zh-CN" dirty="0"/>
-              <a:t> = </a:t>
-            </a:r>
-            <a:r>
-              <a:rPr lang="en-US" altLang="zh-CN" dirty="0" err="1"/>
-              <a:t>p.CategoryID</a:t>
-            </a:r>
-            <a:endParaRPr lang="en-US" altLang="zh-CN" dirty="0"/>
-          </a:p>
-          <a:p>
-            <a:pPr>
-              <a:lnSpc>
-                <a:spcPct val="100000"/>
-              </a:lnSpc>
-              <a:spcAft>
-                <a:spcPts val="0"/>
-              </a:spcAft>
-            </a:pPr>
-            <a:r>
-              <a:rPr lang="en-US" altLang="zh-CN" dirty="0"/>
-              <a:t>JOIN </a:t>
-            </a:r>
-            <a:r>
-              <a:rPr lang="en-US" altLang="zh-CN" dirty="0" err="1"/>
-              <a:t>OrderDetails</a:t>
-            </a:r>
-            <a:r>
-              <a:rPr lang="en-US" altLang="zh-CN" dirty="0"/>
-              <a:t> od</a:t>
-            </a:r>
-          </a:p>
-          <a:p>
-            <a:pPr>
-              <a:lnSpc>
-                <a:spcPct val="100000"/>
-              </a:lnSpc>
-              <a:spcAft>
-                <a:spcPts val="0"/>
-              </a:spcAft>
-            </a:pPr>
-            <a:r>
-              <a:rPr lang="en-US" altLang="zh-CN" dirty="0"/>
-              <a:t>ON </a:t>
-            </a:r>
-            <a:r>
-              <a:rPr lang="en-US" altLang="zh-CN" dirty="0" err="1"/>
-              <a:t>od.ProductID</a:t>
-            </a:r>
-            <a:r>
-              <a:rPr lang="en-US" altLang="zh-CN" dirty="0"/>
-              <a:t> = </a:t>
-            </a:r>
-            <a:r>
-              <a:rPr lang="en-US" altLang="zh-CN" dirty="0" err="1"/>
-              <a:t>p.ProductID</a:t>
-            </a:r>
-            <a:endParaRPr lang="en-US" altLang="zh-CN" dirty="0"/>
-          </a:p>
-          <a:p>
-            <a:pPr>
-              <a:lnSpc>
-                <a:spcPct val="100000"/>
-              </a:lnSpc>
-              <a:spcAft>
-                <a:spcPts val="0"/>
-              </a:spcAft>
-            </a:pPr>
-            <a:r>
-              <a:rPr lang="en-US" altLang="zh-CN" dirty="0"/>
-              <a:t>JOIN Orders o</a:t>
-            </a:r>
-          </a:p>
-          <a:p>
-            <a:pPr>
-              <a:lnSpc>
-                <a:spcPct val="100000"/>
-              </a:lnSpc>
-              <a:spcAft>
-                <a:spcPts val="0"/>
-              </a:spcAft>
-            </a:pPr>
-            <a:r>
-              <a:rPr lang="en-US" altLang="zh-CN" dirty="0"/>
-              <a:t>ON </a:t>
-            </a:r>
-            <a:r>
-              <a:rPr lang="en-US" altLang="zh-CN" dirty="0" err="1"/>
-              <a:t>o.OrderId</a:t>
-            </a:r>
-            <a:r>
-              <a:rPr lang="en-US" altLang="zh-CN" dirty="0"/>
-              <a:t> = </a:t>
-            </a:r>
-            <a:r>
-              <a:rPr lang="en-US" altLang="zh-CN" dirty="0" err="1"/>
-              <a:t>od.OrderID</a:t>
-            </a:r>
-            <a:endParaRPr lang="en-US" altLang="zh-CN" dirty="0"/>
-          </a:p>
-          <a:p>
-            <a:pPr>
-              <a:lnSpc>
-                <a:spcPct val="100000"/>
-              </a:lnSpc>
-              <a:spcAft>
-                <a:spcPts val="0"/>
-              </a:spcAft>
-            </a:pPr>
-            <a:r>
-              <a:rPr lang="en-US" altLang="zh-CN" dirty="0"/>
-              <a:t>WHERE </a:t>
-            </a:r>
-            <a:r>
-              <a:rPr lang="en-US" altLang="zh-CN" dirty="0" err="1"/>
-              <a:t>o.EmployeeID</a:t>
-            </a:r>
-            <a:r>
-              <a:rPr lang="en-US" altLang="zh-CN" dirty="0"/>
-              <a:t> = (SELECT </a:t>
-            </a:r>
-            <a:r>
-              <a:rPr lang="en-US" altLang="zh-CN" dirty="0" err="1"/>
-              <a:t>EmployeeID</a:t>
-            </a:r>
-            <a:r>
-              <a:rPr lang="en-US" altLang="zh-CN" dirty="0"/>
-              <a:t> FROM (SELECT </a:t>
-            </a:r>
-            <a:r>
-              <a:rPr lang="en-US" altLang="zh-CN" dirty="0" err="1"/>
-              <a:t>e.EmployeeID</a:t>
-            </a:r>
-            <a:r>
-              <a:rPr lang="en-US" altLang="zh-CN" dirty="0"/>
-              <a:t>, SUM(</a:t>
-            </a:r>
-            <a:r>
-              <a:rPr lang="en-US" altLang="zh-CN" dirty="0" err="1"/>
-              <a:t>od.UnitPrice</a:t>
-            </a:r>
-            <a:r>
-              <a:rPr lang="en-US" altLang="zh-CN" dirty="0"/>
-              <a:t> * </a:t>
-            </a:r>
-            <a:r>
-              <a:rPr lang="en-US" altLang="zh-CN" dirty="0" err="1"/>
-              <a:t>od.Quantity</a:t>
-            </a:r>
-            <a:r>
-              <a:rPr lang="en-US" altLang="zh-CN" dirty="0"/>
-              <a:t> * (1 - </a:t>
-            </a:r>
-            <a:r>
-              <a:rPr lang="en-US" altLang="zh-CN" dirty="0" err="1"/>
-              <a:t>od.Discount</a:t>
-            </a:r>
-            <a:r>
-              <a:rPr lang="en-US" altLang="zh-CN" dirty="0"/>
-              <a:t>)) AS </a:t>
-            </a:r>
-            <a:r>
-              <a:rPr lang="en-US" altLang="zh-CN" dirty="0" err="1"/>
-              <a:t>TotalSales</a:t>
-            </a:r>
-            <a:r>
-              <a:rPr lang="en-US" altLang="zh-CN" dirty="0"/>
-              <a:t> </a:t>
-            </a:r>
-          </a:p>
-          <a:p>
-            <a:pPr>
-              <a:lnSpc>
-                <a:spcPct val="100000"/>
-              </a:lnSpc>
-              <a:spcAft>
-                <a:spcPts val="0"/>
-              </a:spcAft>
-            </a:pPr>
-            <a:r>
-              <a:rPr lang="en-US" altLang="zh-CN" dirty="0"/>
-              <a:t>FROM Employees e</a:t>
-            </a:r>
-          </a:p>
-          <a:p>
-            <a:pPr>
-              <a:lnSpc>
-                <a:spcPct val="100000"/>
-              </a:lnSpc>
-              <a:spcAft>
-                <a:spcPts val="0"/>
-              </a:spcAft>
-            </a:pPr>
-            <a:r>
-              <a:rPr lang="en-US" altLang="zh-CN" dirty="0"/>
-              <a:t>JOIN Orders o</a:t>
-            </a:r>
-          </a:p>
-          <a:p>
-            <a:pPr>
-              <a:lnSpc>
-                <a:spcPct val="100000"/>
-              </a:lnSpc>
-              <a:spcAft>
-                <a:spcPts val="0"/>
-              </a:spcAft>
-            </a:pPr>
-            <a:r>
-              <a:rPr lang="en-US" altLang="zh-CN" dirty="0"/>
-              <a:t>ON </a:t>
-            </a:r>
-            <a:r>
-              <a:rPr lang="en-US" altLang="zh-CN" dirty="0" err="1"/>
-              <a:t>o.EmployeeID</a:t>
-            </a:r>
-            <a:r>
-              <a:rPr lang="en-US" altLang="zh-CN" dirty="0"/>
-              <a:t> = </a:t>
-            </a:r>
-            <a:r>
-              <a:rPr lang="en-US" altLang="zh-CN" dirty="0" err="1"/>
-              <a:t>e.EmployeeID</a:t>
-            </a:r>
-            <a:endParaRPr lang="en-US" altLang="zh-CN" dirty="0"/>
-          </a:p>
-          <a:p>
-            <a:pPr>
-              <a:lnSpc>
-                <a:spcPct val="100000"/>
-              </a:lnSpc>
-              <a:spcAft>
-                <a:spcPts val="0"/>
-              </a:spcAft>
-            </a:pPr>
-            <a:r>
-              <a:rPr lang="en-US" altLang="zh-CN" dirty="0"/>
-              <a:t>JOIN </a:t>
-            </a:r>
-            <a:r>
-              <a:rPr lang="en-US" altLang="zh-CN" dirty="0" err="1"/>
-              <a:t>OrderDetails</a:t>
-            </a:r>
-            <a:r>
-              <a:rPr lang="en-US" altLang="zh-CN" dirty="0"/>
-              <a:t> od</a:t>
-            </a:r>
-          </a:p>
-          <a:p>
-            <a:pPr>
-              <a:lnSpc>
-                <a:spcPct val="100000"/>
-              </a:lnSpc>
-              <a:spcAft>
-                <a:spcPts val="0"/>
-              </a:spcAft>
-            </a:pPr>
-            <a:r>
-              <a:rPr lang="en-US" altLang="zh-CN" dirty="0"/>
-              <a:t>ON </a:t>
-            </a:r>
-            <a:r>
-              <a:rPr lang="en-US" altLang="zh-CN" dirty="0" err="1"/>
-              <a:t>od.OrderID</a:t>
-            </a:r>
-            <a:r>
-              <a:rPr lang="en-US" altLang="zh-CN" dirty="0"/>
-              <a:t> = </a:t>
-            </a:r>
-            <a:r>
-              <a:rPr lang="en-US" altLang="zh-CN" dirty="0" err="1"/>
-              <a:t>o.OrderId</a:t>
-            </a:r>
-            <a:endParaRPr lang="en-US" altLang="zh-CN" dirty="0"/>
-          </a:p>
-          <a:p>
-            <a:pPr>
-              <a:lnSpc>
-                <a:spcPct val="100000"/>
-              </a:lnSpc>
-              <a:spcAft>
-                <a:spcPts val="0"/>
-              </a:spcAft>
-            </a:pPr>
-            <a:r>
-              <a:rPr lang="en-US" altLang="zh-CN" dirty="0"/>
-              <a:t>GROUP BY 1</a:t>
-            </a:r>
-          </a:p>
-          <a:p>
-            <a:pPr>
-              <a:lnSpc>
-                <a:spcPct val="100000"/>
-              </a:lnSpc>
-              <a:spcAft>
-                <a:spcPts val="0"/>
-              </a:spcAft>
-            </a:pPr>
-            <a:r>
-              <a:rPr lang="en-US" altLang="zh-CN" dirty="0"/>
-              <a:t>ORDER BY 2</a:t>
-            </a:r>
-          </a:p>
-          <a:p>
-            <a:pPr>
-              <a:lnSpc>
-                <a:spcPct val="100000"/>
-              </a:lnSpc>
-              <a:spcAft>
-                <a:spcPts val="0"/>
-              </a:spcAft>
-            </a:pPr>
-            <a:r>
-              <a:rPr lang="en-US" altLang="zh-CN" dirty="0"/>
-              <a:t>DESC</a:t>
-            </a:r>
-          </a:p>
-          <a:p>
-            <a:pPr>
-              <a:lnSpc>
-                <a:spcPct val="100000"/>
-              </a:lnSpc>
-              <a:spcAft>
-                <a:spcPts val="0"/>
-              </a:spcAft>
-            </a:pPr>
-            <a:r>
-              <a:rPr lang="en-US" altLang="zh-CN" dirty="0"/>
-              <a:t>LIMIT 1) t1)</a:t>
-            </a:r>
-          </a:p>
-          <a:p>
-            <a:pPr>
-              <a:lnSpc>
-                <a:spcPct val="100000"/>
-              </a:lnSpc>
-              <a:spcAft>
-                <a:spcPts val="0"/>
-              </a:spcAft>
-            </a:pPr>
-            <a:r>
-              <a:rPr lang="en-US" altLang="zh-CN" dirty="0"/>
-              <a:t>GROUP BY 1</a:t>
-            </a:r>
-          </a:p>
-          <a:p>
-            <a:pPr>
-              <a:lnSpc>
-                <a:spcPct val="100000"/>
-              </a:lnSpc>
-              <a:spcAft>
-                <a:spcPts val="0"/>
-              </a:spcAft>
-            </a:pPr>
-            <a:r>
-              <a:rPr lang="en-US" altLang="zh-CN" dirty="0"/>
-              <a:t>ORDER BY 2 </a:t>
-            </a:r>
-          </a:p>
-          <a:p>
-            <a:pPr>
-              <a:lnSpc>
-                <a:spcPct val="100000"/>
-              </a:lnSpc>
-              <a:spcAft>
-                <a:spcPts val="0"/>
-              </a:spcAft>
-            </a:pPr>
-            <a:r>
-              <a:rPr lang="en-US" altLang="zh-CN" dirty="0"/>
-              <a:t>DESC</a:t>
-            </a:r>
-          </a:p>
-          <a:p>
             <a:pPr lvl="0" rtl="0">
               <a:spcBef>
                 <a:spcPts val="0"/>
@@ -37784,327 +35855,6 @@
               <a:cs typeface="Open Sans"/>
               <a:sym typeface="Open Sans"/>
             </a:endParaRPr>
-          </a:p>
-          <a:p>
-            <a:pPr>
-              <a:lnSpc>
-                <a:spcPct val="100000"/>
-              </a:lnSpc>
-              <a:spcAft>
-                <a:spcPts val="0"/>
-              </a:spcAft>
-            </a:pPr>
-            <a:r>
-              <a:rPr lang="en-US" altLang="zh-CN" dirty="0"/>
-              <a:t>SELECT DISTINCT(</a:t>
-            </a:r>
-            <a:r>
-              <a:rPr lang="en-US" altLang="zh-CN" dirty="0" err="1"/>
-              <a:t>c.CompanyName</a:t>
-            </a:r>
-            <a:r>
-              <a:rPr lang="en-US" altLang="zh-CN" dirty="0"/>
-              <a:t>)</a:t>
-            </a:r>
-          </a:p>
-          <a:p>
-            <a:pPr>
-              <a:lnSpc>
-                <a:spcPct val="100000"/>
-              </a:lnSpc>
-              <a:spcAft>
-                <a:spcPts val="0"/>
-              </a:spcAft>
-            </a:pPr>
-            <a:r>
-              <a:rPr lang="en-US" altLang="zh-CN" dirty="0"/>
-              <a:t>FROM Customers c</a:t>
-            </a:r>
-          </a:p>
-          <a:p>
-            <a:pPr>
-              <a:lnSpc>
-                <a:spcPct val="100000"/>
-              </a:lnSpc>
-              <a:spcAft>
-                <a:spcPts val="0"/>
-              </a:spcAft>
-            </a:pPr>
-            <a:r>
-              <a:rPr lang="en-US" altLang="zh-CN" dirty="0"/>
-              <a:t>JOIN Orders o</a:t>
-            </a:r>
-          </a:p>
-          <a:p>
-            <a:pPr>
-              <a:lnSpc>
-                <a:spcPct val="100000"/>
-              </a:lnSpc>
-              <a:spcAft>
-                <a:spcPts val="0"/>
-              </a:spcAft>
-            </a:pPr>
-            <a:r>
-              <a:rPr lang="en-US" altLang="zh-CN" dirty="0"/>
-              <a:t>ON </a:t>
-            </a:r>
-            <a:r>
-              <a:rPr lang="en-US" altLang="zh-CN" dirty="0" err="1"/>
-              <a:t>c.CustomerID</a:t>
-            </a:r>
-            <a:r>
-              <a:rPr lang="en-US" altLang="zh-CN" dirty="0"/>
-              <a:t> = </a:t>
-            </a:r>
-            <a:r>
-              <a:rPr lang="en-US" altLang="zh-CN" dirty="0" err="1"/>
-              <a:t>o.CustomerID</a:t>
-            </a:r>
-            <a:endParaRPr lang="en-US" altLang="zh-CN" dirty="0"/>
-          </a:p>
-          <a:p>
-            <a:pPr>
-              <a:lnSpc>
-                <a:spcPct val="100000"/>
-              </a:lnSpc>
-              <a:spcAft>
-                <a:spcPts val="0"/>
-              </a:spcAft>
-            </a:pPr>
-            <a:r>
-              <a:rPr lang="en-US" altLang="zh-CN" dirty="0"/>
-              <a:t>WHERE </a:t>
-            </a:r>
-            <a:r>
-              <a:rPr lang="en-US" altLang="zh-CN" dirty="0" err="1"/>
-              <a:t>o.EmployeeID</a:t>
-            </a:r>
-            <a:r>
-              <a:rPr lang="en-US" altLang="zh-CN" dirty="0"/>
-              <a:t> = (SELECT </a:t>
-            </a:r>
-            <a:r>
-              <a:rPr lang="en-US" altLang="zh-CN" dirty="0" err="1"/>
-              <a:t>EmployeeID</a:t>
-            </a:r>
-            <a:r>
-              <a:rPr lang="en-US" altLang="zh-CN" dirty="0"/>
-              <a:t> FROM (SELECT </a:t>
-            </a:r>
-            <a:r>
-              <a:rPr lang="en-US" altLang="zh-CN" dirty="0" err="1"/>
-              <a:t>e.EmployeeID</a:t>
-            </a:r>
-            <a:r>
-              <a:rPr lang="en-US" altLang="zh-CN" dirty="0"/>
-              <a:t>, SUM(</a:t>
-            </a:r>
-            <a:r>
-              <a:rPr lang="en-US" altLang="zh-CN" dirty="0" err="1"/>
-              <a:t>od.UnitPrice</a:t>
-            </a:r>
-            <a:r>
-              <a:rPr lang="en-US" altLang="zh-CN" dirty="0"/>
-              <a:t> * </a:t>
-            </a:r>
-            <a:r>
-              <a:rPr lang="en-US" altLang="zh-CN" dirty="0" err="1"/>
-              <a:t>od.Quantity</a:t>
-            </a:r>
-            <a:r>
-              <a:rPr lang="en-US" altLang="zh-CN" dirty="0"/>
-              <a:t> * (1 - </a:t>
-            </a:r>
-            <a:r>
-              <a:rPr lang="en-US" altLang="zh-CN" dirty="0" err="1"/>
-              <a:t>od.Discount</a:t>
-            </a:r>
-            <a:r>
-              <a:rPr lang="en-US" altLang="zh-CN" dirty="0"/>
-              <a:t>)) AS </a:t>
-            </a:r>
-            <a:r>
-              <a:rPr lang="en-US" altLang="zh-CN" dirty="0" err="1"/>
-              <a:t>TotalSales</a:t>
-            </a:r>
-            <a:r>
-              <a:rPr lang="en-US" altLang="zh-CN" dirty="0"/>
-              <a:t> </a:t>
-            </a:r>
-          </a:p>
-          <a:p>
-            <a:pPr>
-              <a:lnSpc>
-                <a:spcPct val="100000"/>
-              </a:lnSpc>
-              <a:spcAft>
-                <a:spcPts val="0"/>
-              </a:spcAft>
-            </a:pPr>
-            <a:r>
-              <a:rPr lang="en-US" altLang="zh-CN" dirty="0"/>
-              <a:t>FROM Employees e</a:t>
-            </a:r>
-          </a:p>
-          <a:p>
-            <a:pPr>
-              <a:lnSpc>
-                <a:spcPct val="100000"/>
-              </a:lnSpc>
-              <a:spcAft>
-                <a:spcPts val="0"/>
-              </a:spcAft>
-            </a:pPr>
-            <a:r>
-              <a:rPr lang="en-US" altLang="zh-CN" dirty="0"/>
-              <a:t>JOIN Orders o</a:t>
-            </a:r>
-          </a:p>
-          <a:p>
-            <a:pPr>
-              <a:lnSpc>
-                <a:spcPct val="100000"/>
-              </a:lnSpc>
-              <a:spcAft>
-                <a:spcPts val="0"/>
-              </a:spcAft>
-            </a:pPr>
-            <a:r>
-              <a:rPr lang="en-US" altLang="zh-CN" dirty="0"/>
-              <a:t>ON </a:t>
-            </a:r>
-            <a:r>
-              <a:rPr lang="en-US" altLang="zh-CN" dirty="0" err="1"/>
-              <a:t>o.EmployeeID</a:t>
-            </a:r>
-            <a:r>
-              <a:rPr lang="en-US" altLang="zh-CN" dirty="0"/>
-              <a:t> = </a:t>
-            </a:r>
-            <a:r>
-              <a:rPr lang="en-US" altLang="zh-CN" dirty="0" err="1"/>
-              <a:t>e.EmployeeID</a:t>
-            </a:r>
-            <a:endParaRPr lang="en-US" altLang="zh-CN" dirty="0"/>
-          </a:p>
-          <a:p>
-            <a:pPr>
-              <a:lnSpc>
-                <a:spcPct val="100000"/>
-              </a:lnSpc>
-              <a:spcAft>
-                <a:spcPts val="0"/>
-              </a:spcAft>
-            </a:pPr>
-            <a:r>
-              <a:rPr lang="en-US" altLang="zh-CN" dirty="0"/>
-              <a:t>JOIN </a:t>
-            </a:r>
-            <a:r>
-              <a:rPr lang="en-US" altLang="zh-CN" dirty="0" err="1"/>
-              <a:t>OrderDetails</a:t>
-            </a:r>
-            <a:r>
-              <a:rPr lang="en-US" altLang="zh-CN" dirty="0"/>
-              <a:t> od</a:t>
-            </a:r>
-          </a:p>
-          <a:p>
-            <a:pPr>
-              <a:lnSpc>
-                <a:spcPct val="100000"/>
-              </a:lnSpc>
-              <a:spcAft>
-                <a:spcPts val="0"/>
-              </a:spcAft>
-            </a:pPr>
-            <a:r>
-              <a:rPr lang="en-US" altLang="zh-CN" dirty="0"/>
-              <a:t>ON </a:t>
-            </a:r>
-            <a:r>
-              <a:rPr lang="en-US" altLang="zh-CN" dirty="0" err="1"/>
-              <a:t>od.OrderID</a:t>
-            </a:r>
-            <a:r>
-              <a:rPr lang="en-US" altLang="zh-CN" dirty="0"/>
-              <a:t> = </a:t>
-            </a:r>
-            <a:r>
-              <a:rPr lang="en-US" altLang="zh-CN" dirty="0" err="1"/>
-              <a:t>o.OrderId</a:t>
-            </a:r>
-            <a:endParaRPr lang="en-US" altLang="zh-CN" dirty="0"/>
-          </a:p>
-          <a:p>
-            <a:pPr>
-              <a:lnSpc>
-                <a:spcPct val="100000"/>
-              </a:lnSpc>
-              <a:spcAft>
-                <a:spcPts val="0"/>
-              </a:spcAft>
-            </a:pPr>
-            <a:r>
-              <a:rPr lang="en-US" altLang="zh-CN" dirty="0"/>
-              <a:t>GROUP BY 1</a:t>
-            </a:r>
-          </a:p>
-          <a:p>
-            <a:pPr>
-              <a:lnSpc>
-                <a:spcPct val="100000"/>
-              </a:lnSpc>
-              <a:spcAft>
-                <a:spcPts val="0"/>
-              </a:spcAft>
-            </a:pPr>
-            <a:r>
-              <a:rPr lang="en-US" altLang="zh-CN" dirty="0"/>
-              <a:t>ORDER BY 2</a:t>
-            </a:r>
-          </a:p>
-          <a:p>
-            <a:pPr>
-              <a:lnSpc>
-                <a:spcPct val="100000"/>
-              </a:lnSpc>
-              <a:spcAft>
-                <a:spcPts val="0"/>
-              </a:spcAft>
-            </a:pPr>
-            <a:r>
-              <a:rPr lang="en-US" altLang="zh-CN" dirty="0"/>
-              <a:t>DESC</a:t>
-            </a:r>
-          </a:p>
-          <a:p>
-            <a:pPr>
-              <a:lnSpc>
-                <a:spcPct val="100000"/>
-              </a:lnSpc>
-              <a:spcAft>
-                <a:spcPts val="0"/>
-              </a:spcAft>
-            </a:pPr>
-            <a:r>
-              <a:rPr lang="en-US" altLang="zh-CN" dirty="0"/>
-              <a:t>LIMIT 1) t1)</a:t>
-            </a:r>
-          </a:p>
-          <a:p>
-            <a:pPr>
-              <a:lnSpc>
-                <a:spcPct val="100000"/>
-              </a:lnSpc>
-              <a:spcAft>
-                <a:spcPts val="0"/>
-              </a:spcAft>
-            </a:pPr>
-            <a:r>
-              <a:rPr lang="en-US" altLang="zh-CN" dirty="0"/>
-              <a:t>ORDER BY 1</a:t>
-            </a:r>
           </a:p>
           <a:p>
             <a:pPr lvl="0" rtl="0">
@@ -40965,217 +38715,6 @@
             </a:endParaRPr>
           </a:p>
           <a:p>
-            <a:pPr>
-              <a:lnSpc>
-                <a:spcPct val="100000"/>
-              </a:lnSpc>
-              <a:spcAft>
-                <a:spcPts val="0"/>
-              </a:spcAft>
-            </a:pPr>
-            <a:r>
-              <a:rPr lang="en-US" altLang="zh-CN" dirty="0"/>
-              <a:t>SELECT </a:t>
-            </a:r>
-            <a:r>
-              <a:rPr lang="en-US" altLang="zh-CN" dirty="0" err="1"/>
-              <a:t>c.CompanyName</a:t>
-            </a:r>
-            <a:r>
-              <a:rPr lang="en-US" altLang="zh-CN" dirty="0"/>
-              <a:t>, SUM(</a:t>
-            </a:r>
-            <a:r>
-              <a:rPr lang="en-US" altLang="zh-CN" dirty="0" err="1"/>
-              <a:t>d.UnitPrice</a:t>
-            </a:r>
-            <a:r>
-              <a:rPr lang="en-US" altLang="zh-CN" dirty="0"/>
-              <a:t> * </a:t>
-            </a:r>
-            <a:r>
-              <a:rPr lang="en-US" altLang="zh-CN" dirty="0" err="1"/>
-              <a:t>d.Quantity</a:t>
-            </a:r>
-            <a:r>
-              <a:rPr lang="en-US" altLang="zh-CN" dirty="0"/>
-              <a:t> * (1 - </a:t>
-            </a:r>
-            <a:r>
-              <a:rPr lang="en-US" altLang="zh-CN" dirty="0" err="1"/>
-              <a:t>d.Discount</a:t>
-            </a:r>
-            <a:r>
-              <a:rPr lang="en-US" altLang="zh-CN" dirty="0"/>
-              <a:t>)) AS TOTAL_COST</a:t>
-            </a:r>
-          </a:p>
-          <a:p>
-            <a:pPr>
-              <a:lnSpc>
-                <a:spcPct val="100000"/>
-              </a:lnSpc>
-              <a:spcAft>
-                <a:spcPts val="0"/>
-              </a:spcAft>
-            </a:pPr>
-            <a:r>
-              <a:rPr lang="en-US" altLang="zh-CN" dirty="0"/>
-              <a:t>FROM Customers c</a:t>
-            </a:r>
-          </a:p>
-          <a:p>
-            <a:pPr>
-              <a:lnSpc>
-                <a:spcPct val="100000"/>
-              </a:lnSpc>
-              <a:spcAft>
-                <a:spcPts val="0"/>
-              </a:spcAft>
-            </a:pPr>
-            <a:r>
-              <a:rPr lang="en-US" altLang="zh-CN" dirty="0"/>
-              <a:t>JOIN Orders o</a:t>
-            </a:r>
-          </a:p>
-          <a:p>
-            <a:pPr>
-              <a:lnSpc>
-                <a:spcPct val="100000"/>
-              </a:lnSpc>
-              <a:spcAft>
-                <a:spcPts val="0"/>
-              </a:spcAft>
-            </a:pPr>
-            <a:r>
-              <a:rPr lang="en-US" altLang="zh-CN" dirty="0"/>
-              <a:t>ON </a:t>
-            </a:r>
-            <a:r>
-              <a:rPr lang="en-US" altLang="zh-CN" dirty="0" err="1"/>
-              <a:t>c.CustomerID</a:t>
-            </a:r>
-            <a:r>
-              <a:rPr lang="en-US" altLang="zh-CN" dirty="0"/>
-              <a:t> = </a:t>
-            </a:r>
-            <a:r>
-              <a:rPr lang="en-US" altLang="zh-CN" dirty="0" err="1"/>
-              <a:t>o.CustomerID</a:t>
-            </a:r>
-            <a:endParaRPr lang="en-US" altLang="zh-CN" dirty="0"/>
-          </a:p>
-          <a:p>
-            <a:pPr>
-              <a:lnSpc>
-                <a:spcPct val="100000"/>
-              </a:lnSpc>
-              <a:spcAft>
-                <a:spcPts val="0"/>
-              </a:spcAft>
-            </a:pPr>
-            <a:r>
-              <a:rPr lang="en-US" altLang="zh-CN" dirty="0"/>
-              <a:t>JOIN </a:t>
-            </a:r>
-            <a:r>
-              <a:rPr lang="en-US" altLang="zh-CN" dirty="0" err="1"/>
-              <a:t>OrderDetails</a:t>
-            </a:r>
-            <a:r>
-              <a:rPr lang="en-US" altLang="zh-CN" dirty="0"/>
-              <a:t> d</a:t>
-            </a:r>
-          </a:p>
-          <a:p>
-            <a:pPr>
-              <a:lnSpc>
-                <a:spcPct val="100000"/>
-              </a:lnSpc>
-              <a:spcAft>
-                <a:spcPts val="0"/>
-              </a:spcAft>
-            </a:pPr>
-            <a:r>
-              <a:rPr lang="en-US" altLang="zh-CN" dirty="0"/>
-              <a:t>ON </a:t>
-            </a:r>
-            <a:r>
-              <a:rPr lang="en-US" altLang="zh-CN" dirty="0" err="1"/>
-              <a:t>o.OrderId</a:t>
-            </a:r>
-            <a:r>
-              <a:rPr lang="en-US" altLang="zh-CN" dirty="0"/>
-              <a:t> = </a:t>
-            </a:r>
-            <a:r>
-              <a:rPr lang="en-US" altLang="zh-CN" dirty="0" err="1"/>
-              <a:t>d.OrderID</a:t>
-            </a:r>
-            <a:endParaRPr lang="en-US" altLang="zh-CN" dirty="0"/>
-          </a:p>
-          <a:p>
-            <a:pPr>
-              <a:lnSpc>
-                <a:spcPct val="100000"/>
-              </a:lnSpc>
-              <a:spcAft>
-                <a:spcPts val="0"/>
-              </a:spcAft>
-            </a:pPr>
-            <a:r>
-              <a:rPr lang="en-US" altLang="zh-CN" dirty="0"/>
-              <a:t>GROUP BY </a:t>
-            </a:r>
-            <a:r>
-              <a:rPr lang="en-US" altLang="zh-CN" dirty="0" err="1"/>
-              <a:t>c.CompanyName</a:t>
-            </a:r>
-            <a:endParaRPr lang="en-US" altLang="zh-CN" dirty="0"/>
-          </a:p>
-          <a:p>
-            <a:pPr>
-              <a:lnSpc>
-                <a:spcPct val="100000"/>
-              </a:lnSpc>
-              <a:spcAft>
-                <a:spcPts val="0"/>
-              </a:spcAft>
-            </a:pPr>
-            <a:r>
-              <a:rPr lang="en-US" altLang="zh-CN" dirty="0"/>
-              <a:t>ORDER BY TOTAL_COST</a:t>
-            </a:r>
-          </a:p>
-          <a:p>
-            <a:pPr>
-              <a:lnSpc>
-                <a:spcPct val="100000"/>
-              </a:lnSpc>
-              <a:spcAft>
-                <a:spcPts val="0"/>
-              </a:spcAft>
-            </a:pPr>
-            <a:r>
-              <a:rPr lang="en-US" altLang="zh-CN" dirty="0"/>
-              <a:t>DESC</a:t>
-            </a:r>
-          </a:p>
-          <a:p>
-            <a:pPr>
-              <a:lnSpc>
-                <a:spcPct val="100000"/>
-              </a:lnSpc>
-              <a:spcAft>
-                <a:spcPts val="0"/>
-              </a:spcAft>
-            </a:pPr>
-            <a:r>
-              <a:rPr lang="en-US" altLang="zh-CN" dirty="0"/>
-              <a:t>LIMIT 10</a:t>
-            </a:r>
-          </a:p>
-          <a:p>
             <a:pPr lvl="0" rtl="0">
               <a:spcBef>
                 <a:spcPts val="0"/>
@@ -41472,597 +39011,6 @@
             </a:endParaRPr>
           </a:p>
           <a:p>
-            <a:pPr>
-              <a:lnSpc>
-                <a:spcPct val="100000"/>
-              </a:lnSpc>
-              <a:spcAft>
-                <a:spcPts val="0"/>
-              </a:spcAft>
-            </a:pPr>
-            <a:r>
-              <a:rPr lang="en-US" altLang="zh-CN" dirty="0"/>
-              <a:t>WITH </a:t>
-            </a:r>
-            <a:r>
-              <a:rPr lang="en-US" altLang="zh-CN" dirty="0" err="1"/>
-              <a:t>TopCustomers</a:t>
-            </a:r>
-            <a:r>
-              <a:rPr lang="en-US" altLang="zh-CN" dirty="0"/>
-              <a:t> AS (</a:t>
-            </a:r>
-          </a:p>
-          <a:p>
-            <a:pPr>
-              <a:lnSpc>
-                <a:spcPct val="100000"/>
-              </a:lnSpc>
-              <a:spcAft>
-                <a:spcPts val="0"/>
-              </a:spcAft>
-            </a:pPr>
-            <a:r>
-              <a:rPr lang="en-US" altLang="zh-CN" dirty="0"/>
-              <a:t>SELECT </a:t>
-            </a:r>
-            <a:r>
-              <a:rPr lang="en-US" altLang="zh-CN" dirty="0" err="1"/>
-              <a:t>CustomerID</a:t>
-            </a:r>
-            <a:endParaRPr lang="en-US" altLang="zh-CN" dirty="0"/>
-          </a:p>
-          <a:p>
-            <a:pPr>
-              <a:lnSpc>
-                <a:spcPct val="100000"/>
-              </a:lnSpc>
-              <a:spcAft>
-                <a:spcPts val="0"/>
-              </a:spcAft>
-            </a:pPr>
-            <a:r>
-              <a:rPr lang="en-US" altLang="zh-CN" dirty="0"/>
-              <a:t>FROM (SELECT </a:t>
-            </a:r>
-            <a:r>
-              <a:rPr lang="en-US" altLang="zh-CN" dirty="0" err="1"/>
-              <a:t>c.CustomerID</a:t>
-            </a:r>
-            <a:r>
-              <a:rPr lang="en-US" altLang="zh-CN" dirty="0"/>
-              <a:t>, SUM(</a:t>
-            </a:r>
-            <a:r>
-              <a:rPr lang="en-US" altLang="zh-CN" dirty="0" err="1"/>
-              <a:t>d.UnitPrice</a:t>
-            </a:r>
-            <a:r>
-              <a:rPr lang="en-US" altLang="zh-CN" dirty="0"/>
-              <a:t> * </a:t>
-            </a:r>
-            <a:r>
-              <a:rPr lang="en-US" altLang="zh-CN" dirty="0" err="1"/>
-              <a:t>d.Quantity</a:t>
-            </a:r>
-            <a:r>
-              <a:rPr lang="en-US" altLang="zh-CN" dirty="0"/>
-              <a:t> * (1 - </a:t>
-            </a:r>
-            <a:r>
-              <a:rPr lang="en-US" altLang="zh-CN" dirty="0" err="1"/>
-              <a:t>d.Discount</a:t>
-            </a:r>
-            <a:r>
-              <a:rPr lang="en-US" altLang="zh-CN" dirty="0"/>
-              <a:t>)) AS TOTAL_COST</a:t>
-            </a:r>
-          </a:p>
-          <a:p>
-            <a:pPr>
-              <a:lnSpc>
-                <a:spcPct val="100000"/>
-              </a:lnSpc>
-              <a:spcAft>
-                <a:spcPts val="0"/>
-              </a:spcAft>
-            </a:pPr>
-            <a:r>
-              <a:rPr lang="en-US" altLang="zh-CN" dirty="0"/>
-              <a:t>        FROM Customers c</a:t>
-            </a:r>
-          </a:p>
-          <a:p>
-            <a:pPr>
-              <a:lnSpc>
-                <a:spcPct val="100000"/>
-              </a:lnSpc>
-              <a:spcAft>
-                <a:spcPts val="0"/>
-              </a:spcAft>
-            </a:pPr>
-            <a:r>
-              <a:rPr lang="en-US" altLang="zh-CN" dirty="0"/>
-              <a:t>        JOIN Orders o</a:t>
-            </a:r>
-          </a:p>
-          <a:p>
-            <a:pPr>
-              <a:lnSpc>
-                <a:spcPct val="100000"/>
-              </a:lnSpc>
-              <a:spcAft>
-                <a:spcPts val="0"/>
-              </a:spcAft>
-            </a:pPr>
-            <a:r>
-              <a:rPr lang="en-US" altLang="zh-CN" dirty="0"/>
-              <a:t>        ON </a:t>
-            </a:r>
-            <a:r>
-              <a:rPr lang="en-US" altLang="zh-CN" dirty="0" err="1"/>
-              <a:t>c.CustomerID</a:t>
-            </a:r>
-            <a:r>
-              <a:rPr lang="en-US" altLang="zh-CN" dirty="0"/>
-              <a:t> = </a:t>
-            </a:r>
-            <a:r>
-              <a:rPr lang="en-US" altLang="zh-CN" dirty="0" err="1"/>
-              <a:t>o.CustomerID</a:t>
-            </a:r>
-            <a:endParaRPr lang="en-US" altLang="zh-CN" dirty="0"/>
-          </a:p>
-          <a:p>
-            <a:pPr>
-              <a:lnSpc>
-                <a:spcPct val="100000"/>
-              </a:lnSpc>
-              <a:spcAft>
-                <a:spcPts val="0"/>
-              </a:spcAft>
-            </a:pPr>
-            <a:r>
-              <a:rPr lang="en-US" altLang="zh-CN" dirty="0"/>
-              <a:t>        JOIN </a:t>
-            </a:r>
-            <a:r>
-              <a:rPr lang="en-US" altLang="zh-CN" dirty="0" err="1"/>
-              <a:t>OrderDetails</a:t>
-            </a:r>
-            <a:r>
-              <a:rPr lang="en-US" altLang="zh-CN" dirty="0"/>
-              <a:t> d</a:t>
-            </a:r>
-          </a:p>
-          <a:p>
-            <a:pPr>
-              <a:lnSpc>
-                <a:spcPct val="100000"/>
-              </a:lnSpc>
-              <a:spcAft>
-                <a:spcPts val="0"/>
-              </a:spcAft>
-            </a:pPr>
-            <a:r>
-              <a:rPr lang="en-US" altLang="zh-CN" dirty="0"/>
-              <a:t>        ON </a:t>
-            </a:r>
-            <a:r>
-              <a:rPr lang="en-US" altLang="zh-CN" dirty="0" err="1"/>
-              <a:t>o.OrderId</a:t>
-            </a:r>
-            <a:r>
-              <a:rPr lang="en-US" altLang="zh-CN" dirty="0"/>
-              <a:t> = </a:t>
-            </a:r>
-            <a:r>
-              <a:rPr lang="en-US" altLang="zh-CN" dirty="0" err="1"/>
-              <a:t>d.OrderID</a:t>
-            </a:r>
-            <a:endParaRPr lang="en-US" altLang="zh-CN" dirty="0"/>
-          </a:p>
-          <a:p>
-            <a:pPr>
-              <a:lnSpc>
-                <a:spcPct val="100000"/>
-              </a:lnSpc>
-              <a:spcAft>
-                <a:spcPts val="0"/>
-              </a:spcAft>
-            </a:pPr>
-            <a:r>
-              <a:rPr lang="en-US" altLang="zh-CN" dirty="0"/>
-              <a:t>        GROUP BY </a:t>
-            </a:r>
-            <a:r>
-              <a:rPr lang="en-US" altLang="zh-CN" dirty="0" err="1"/>
-              <a:t>c.CustomerID</a:t>
-            </a:r>
-            <a:endParaRPr lang="en-US" altLang="zh-CN" dirty="0"/>
-          </a:p>
-          <a:p>
-            <a:pPr>
-              <a:lnSpc>
-                <a:spcPct val="100000"/>
-              </a:lnSpc>
-              <a:spcAft>
-                <a:spcPts val="0"/>
-              </a:spcAft>
-            </a:pPr>
-            <a:r>
-              <a:rPr lang="en-US" altLang="zh-CN" dirty="0"/>
-              <a:t>        ORDER BY TOTAL_COST</a:t>
-            </a:r>
-          </a:p>
-          <a:p>
-            <a:pPr>
-              <a:lnSpc>
-                <a:spcPct val="100000"/>
-              </a:lnSpc>
-              <a:spcAft>
-                <a:spcPts val="0"/>
-              </a:spcAft>
-            </a:pPr>
-            <a:r>
-              <a:rPr lang="en-US" altLang="zh-CN" dirty="0"/>
-              <a:t>        DESC</a:t>
-            </a:r>
-          </a:p>
-          <a:p>
-            <a:pPr>
-              <a:lnSpc>
-                <a:spcPct val="100000"/>
-              </a:lnSpc>
-              <a:spcAft>
-                <a:spcPts val="0"/>
-              </a:spcAft>
-            </a:pPr>
-            <a:r>
-              <a:rPr lang="en-US" altLang="zh-CN" dirty="0"/>
-              <a:t>        LIMIT 10) sub)</a:t>
-            </a:r>
-          </a:p>
-          <a:p>
-            <a:pPr>
-              <a:lnSpc>
-                <a:spcPct val="100000"/>
-              </a:lnSpc>
-              <a:spcAft>
-                <a:spcPts val="0"/>
-              </a:spcAft>
-            </a:pPr>
-            <a:br>
-              <a:rPr lang="en-US" altLang="zh-CN" dirty="0"/>
-            </a:br>
-            <a:r>
-              <a:rPr lang="en-US" altLang="zh-CN" dirty="0"/>
-              <a:t>SELECT CompanyName, </a:t>
-            </a:r>
-            <a:r>
-              <a:rPr lang="en-US" altLang="zh-CN" dirty="0" err="1"/>
-              <a:t>CategoryName</a:t>
-            </a:r>
-            <a:r>
-              <a:rPr lang="en-US" altLang="zh-CN" dirty="0"/>
-              <a:t>, SUM(</a:t>
-            </a:r>
-            <a:r>
-              <a:rPr lang="en-US" altLang="zh-CN" dirty="0" err="1"/>
-              <a:t>d.UnitPrice</a:t>
-            </a:r>
-            <a:r>
-              <a:rPr lang="en-US" altLang="zh-CN" dirty="0"/>
-              <a:t> * </a:t>
-            </a:r>
-            <a:r>
-              <a:rPr lang="en-US" altLang="zh-CN" dirty="0" err="1"/>
-              <a:t>d.Quantity</a:t>
-            </a:r>
-            <a:r>
-              <a:rPr lang="en-US" altLang="zh-CN" dirty="0"/>
-              <a:t> * (1 - </a:t>
-            </a:r>
-            <a:r>
-              <a:rPr lang="en-US" altLang="zh-CN" dirty="0" err="1"/>
-              <a:t>d.Discount</a:t>
-            </a:r>
-            <a:r>
-              <a:rPr lang="en-US" altLang="zh-CN" dirty="0"/>
-              <a:t>)) AS </a:t>
-            </a:r>
-            <a:r>
-              <a:rPr lang="en-US" altLang="zh-CN" dirty="0" err="1"/>
-              <a:t>TotalCost</a:t>
-            </a:r>
-            <a:endParaRPr lang="en-US" altLang="zh-CN" dirty="0"/>
-          </a:p>
-          <a:p>
-            <a:pPr>
-              <a:lnSpc>
-                <a:spcPct val="100000"/>
-              </a:lnSpc>
-              <a:spcAft>
-                <a:spcPts val="0"/>
-              </a:spcAft>
-            </a:pPr>
-            <a:r>
-              <a:rPr lang="en-US" altLang="zh-CN" dirty="0"/>
-              <a:t>FROM Customers c</a:t>
-            </a:r>
-          </a:p>
-          <a:p>
-            <a:pPr>
-              <a:lnSpc>
-                <a:spcPct val="100000"/>
-              </a:lnSpc>
-              <a:spcAft>
-                <a:spcPts val="0"/>
-              </a:spcAft>
-            </a:pPr>
-            <a:r>
-              <a:rPr lang="en-US" altLang="zh-CN" dirty="0"/>
-              <a:t>JOIN Orders o</a:t>
-            </a:r>
-          </a:p>
-          <a:p>
-            <a:pPr>
-              <a:lnSpc>
-                <a:spcPct val="100000"/>
-              </a:lnSpc>
-              <a:spcAft>
-                <a:spcPts val="0"/>
-              </a:spcAft>
-            </a:pPr>
-            <a:r>
-              <a:rPr lang="en-US" altLang="zh-CN" dirty="0"/>
-              <a:t>ON </a:t>
-            </a:r>
-            <a:r>
-              <a:rPr lang="en-US" altLang="zh-CN" dirty="0" err="1"/>
-              <a:t>c.CustomerID</a:t>
-            </a:r>
-            <a:r>
-              <a:rPr lang="en-US" altLang="zh-CN" dirty="0"/>
-              <a:t> = </a:t>
-            </a:r>
-            <a:r>
-              <a:rPr lang="en-US" altLang="zh-CN" dirty="0" err="1"/>
-              <a:t>o.CustomerID</a:t>
-            </a:r>
-            <a:endParaRPr lang="en-US" altLang="zh-CN" dirty="0"/>
-          </a:p>
-          <a:p>
-            <a:pPr>
-              <a:lnSpc>
-                <a:spcPct val="100000"/>
-              </a:lnSpc>
-              <a:spcAft>
-                <a:spcPts val="0"/>
-              </a:spcAft>
-            </a:pPr>
-            <a:r>
-              <a:rPr lang="en-US" altLang="zh-CN" dirty="0"/>
-              <a:t>JOIN </a:t>
-            </a:r>
-            <a:r>
-              <a:rPr lang="en-US" altLang="zh-CN" dirty="0" err="1"/>
-              <a:t>OrderDetails</a:t>
-            </a:r>
-            <a:r>
-              <a:rPr lang="en-US" altLang="zh-CN" dirty="0"/>
-              <a:t> d</a:t>
-            </a:r>
-          </a:p>
-          <a:p>
-            <a:pPr>
-              <a:lnSpc>
-                <a:spcPct val="100000"/>
-              </a:lnSpc>
-              <a:spcAft>
-                <a:spcPts val="0"/>
-              </a:spcAft>
-            </a:pPr>
-            <a:r>
-              <a:rPr lang="en-US" altLang="zh-CN" dirty="0"/>
-              <a:t>ON </a:t>
-            </a:r>
-            <a:r>
-              <a:rPr lang="en-US" altLang="zh-CN" dirty="0" err="1"/>
-              <a:t>o.OrderId</a:t>
-            </a:r>
-            <a:r>
-              <a:rPr lang="en-US" altLang="zh-CN" dirty="0"/>
-              <a:t> = </a:t>
-            </a:r>
-            <a:r>
-              <a:rPr lang="en-US" altLang="zh-CN" dirty="0" err="1"/>
-              <a:t>d.OrderID</a:t>
-            </a:r>
-            <a:endParaRPr lang="en-US" altLang="zh-CN" dirty="0"/>
-          </a:p>
-          <a:p>
-            <a:pPr>
-              <a:lnSpc>
-                <a:spcPct val="100000"/>
-              </a:lnSpc>
-              <a:spcAft>
-                <a:spcPts val="0"/>
-              </a:spcAft>
-            </a:pPr>
-            <a:r>
-              <a:rPr lang="en-US" altLang="zh-CN" dirty="0"/>
-              <a:t>JOIN Products p</a:t>
-            </a:r>
-          </a:p>
-          <a:p>
-            <a:pPr>
-              <a:lnSpc>
-                <a:spcPct val="100000"/>
-              </a:lnSpc>
-              <a:spcAft>
-                <a:spcPts val="0"/>
-              </a:spcAft>
-            </a:pPr>
-            <a:r>
-              <a:rPr lang="en-US" altLang="zh-CN" dirty="0"/>
-              <a:t>ON </a:t>
-            </a:r>
-            <a:r>
-              <a:rPr lang="en-US" altLang="zh-CN" dirty="0" err="1"/>
-              <a:t>d.ProductID</a:t>
-            </a:r>
-            <a:r>
-              <a:rPr lang="en-US" altLang="zh-CN" dirty="0"/>
-              <a:t> = </a:t>
-            </a:r>
-            <a:r>
-              <a:rPr lang="en-US" altLang="zh-CN" dirty="0" err="1"/>
-              <a:t>p.ProductID</a:t>
-            </a:r>
-            <a:endParaRPr lang="en-US" altLang="zh-CN" dirty="0"/>
-          </a:p>
-          <a:p>
-            <a:pPr>
-              <a:lnSpc>
-                <a:spcPct val="100000"/>
-              </a:lnSpc>
-              <a:spcAft>
-                <a:spcPts val="0"/>
-              </a:spcAft>
-            </a:pPr>
-            <a:r>
-              <a:rPr lang="en-US" altLang="zh-CN" dirty="0"/>
-              <a:t>JOIN Categories cs</a:t>
-            </a:r>
-          </a:p>
-          <a:p>
-            <a:pPr>
-              <a:lnSpc>
-                <a:spcPct val="100000"/>
-              </a:lnSpc>
-              <a:spcAft>
-                <a:spcPts val="0"/>
-              </a:spcAft>
-            </a:pPr>
-            <a:r>
-              <a:rPr lang="en-US" altLang="zh-CN" dirty="0"/>
-              <a:t>ON </a:t>
-            </a:r>
-            <a:r>
-              <a:rPr lang="en-US" altLang="zh-CN" dirty="0" err="1"/>
-              <a:t>p.CategoryID</a:t>
-            </a:r>
-            <a:r>
-              <a:rPr lang="en-US" altLang="zh-CN" dirty="0"/>
-              <a:t> = </a:t>
-            </a:r>
-            <a:r>
-              <a:rPr lang="en-US" altLang="zh-CN" dirty="0" err="1"/>
-              <a:t>cs.CategoryID</a:t>
-            </a:r>
-            <a:endParaRPr lang="en-US" altLang="zh-CN" dirty="0"/>
-          </a:p>
-          <a:p>
-            <a:pPr>
-              <a:lnSpc>
-                <a:spcPct val="100000"/>
-              </a:lnSpc>
-              <a:spcAft>
-                <a:spcPts val="0"/>
-              </a:spcAft>
-            </a:pPr>
-            <a:r>
-              <a:rPr lang="en-US" altLang="zh-CN" dirty="0"/>
-              <a:t>JOIN </a:t>
-            </a:r>
-            <a:r>
-              <a:rPr lang="en-US" altLang="zh-CN" dirty="0" err="1"/>
-              <a:t>TopCustomers</a:t>
-            </a:r>
-            <a:r>
-              <a:rPr lang="en-US" altLang="zh-CN" dirty="0"/>
-              <a:t> t1</a:t>
-            </a:r>
-          </a:p>
-          <a:p>
-            <a:pPr>
-              <a:lnSpc>
-                <a:spcPct val="100000"/>
-              </a:lnSpc>
-              <a:spcAft>
-                <a:spcPts val="0"/>
-              </a:spcAft>
-            </a:pPr>
-            <a:r>
-              <a:rPr lang="en-US" altLang="zh-CN" dirty="0"/>
-              <a:t>ON </a:t>
-            </a:r>
-            <a:r>
-              <a:rPr lang="en-US" altLang="zh-CN" dirty="0" err="1"/>
-              <a:t>c.CustomerID</a:t>
-            </a:r>
-            <a:r>
-              <a:rPr lang="en-US" altLang="zh-CN" dirty="0"/>
-              <a:t> = t1.CustomerID</a:t>
-            </a:r>
-          </a:p>
-          <a:p>
-            <a:pPr>
-              <a:lnSpc>
-                <a:spcPct val="100000"/>
-              </a:lnSpc>
-              <a:spcAft>
-                <a:spcPts val="0"/>
-              </a:spcAft>
-            </a:pPr>
-            <a:r>
-              <a:rPr lang="en-US" altLang="zh-CN" dirty="0"/>
-              <a:t>GROUP BY CompanyName, </a:t>
-            </a:r>
-            <a:r>
-              <a:rPr lang="en-US" altLang="zh-CN" dirty="0" err="1"/>
-              <a:t>CategoryName</a:t>
-            </a:r>
-            <a:endParaRPr lang="en-US" altLang="zh-CN" dirty="0"/>
-          </a:p>
-          <a:p>
-            <a:pPr>
-              <a:lnSpc>
-                <a:spcPct val="100000"/>
-              </a:lnSpc>
-              <a:spcAft>
-                <a:spcPts val="0"/>
-              </a:spcAft>
-            </a:pPr>
-            <a:r>
-              <a:rPr lang="en-US" altLang="zh-CN" dirty="0"/>
-              <a:t>ORDER BY CompanyName, </a:t>
-            </a:r>
-            <a:r>
-              <a:rPr lang="en-US" altLang="zh-CN" dirty="0" err="1"/>
-              <a:t>TotalCost</a:t>
-            </a:r>
-            <a:r>
-              <a:rPr lang="en-US" altLang="zh-CN" dirty="0"/>
-              <a:t> </a:t>
-            </a:r>
-          </a:p>
-          <a:p>
-            <a:pPr>
-              <a:lnSpc>
-                <a:spcPct val="100000"/>
-              </a:lnSpc>
-              <a:spcAft>
-                <a:spcPts val="0"/>
-              </a:spcAft>
-            </a:pPr>
-            <a:r>
-              <a:rPr lang="en-US" altLang="zh-CN" dirty="0"/>
-              <a:t>DESC;</a:t>
-            </a:r>
-          </a:p>
-          <a:p>
             <a:pPr lvl="0" rtl="0">
               <a:spcBef>
                 <a:spcPts val="0"/>
@@ -42349,211 +39297,6 @@
               <a:cs typeface="Open Sans"/>
               <a:sym typeface="Open Sans"/>
             </a:endParaRPr>
-          </a:p>
-          <a:p>
-            <a:pPr>
-              <a:lnSpc>
-                <a:spcPct val="100000"/>
-              </a:lnSpc>
-              <a:spcAft>
-                <a:spcPts val="0"/>
-              </a:spcAft>
-            </a:pPr>
-            <a:r>
-              <a:rPr lang="en-US" altLang="zh-CN" dirty="0"/>
-              <a:t>SELECT </a:t>
-            </a:r>
-            <a:r>
-              <a:rPr lang="en-US" altLang="zh-CN" dirty="0" err="1"/>
-              <a:t>c.CompanyName</a:t>
-            </a:r>
-            <a:r>
-              <a:rPr lang="en-US" altLang="zh-CN" dirty="0"/>
-              <a:t>, COUNT(</a:t>
-            </a:r>
-            <a:r>
-              <a:rPr lang="en-US" altLang="zh-CN" dirty="0" err="1"/>
-              <a:t>e.EmployeeID</a:t>
-            </a:r>
-            <a:r>
-              <a:rPr lang="en-US" altLang="zh-CN" dirty="0"/>
-              <a:t>) AS </a:t>
-            </a:r>
-            <a:r>
-              <a:rPr lang="en-US" altLang="zh-CN" dirty="0" err="1"/>
-              <a:t>EmployeesNum</a:t>
-            </a:r>
-            <a:endParaRPr lang="en-US" altLang="zh-CN" dirty="0"/>
-          </a:p>
-          <a:p>
-            <a:pPr>
-              <a:lnSpc>
-                <a:spcPct val="100000"/>
-              </a:lnSpc>
-              <a:spcAft>
-                <a:spcPts val="0"/>
-              </a:spcAft>
-            </a:pPr>
-            <a:r>
-              <a:rPr lang="en-US" altLang="zh-CN" dirty="0"/>
-              <a:t>FROM Customers c</a:t>
-            </a:r>
-          </a:p>
-          <a:p>
-            <a:pPr>
-              <a:lnSpc>
-                <a:spcPct val="100000"/>
-              </a:lnSpc>
-              <a:spcAft>
-                <a:spcPts val="0"/>
-              </a:spcAft>
-            </a:pPr>
-            <a:r>
-              <a:rPr lang="en-US" altLang="zh-CN" dirty="0"/>
-              <a:t>JOIN Orders o</a:t>
-            </a:r>
-          </a:p>
-          <a:p>
-            <a:pPr>
-              <a:lnSpc>
-                <a:spcPct val="100000"/>
-              </a:lnSpc>
-              <a:spcAft>
-                <a:spcPts val="0"/>
-              </a:spcAft>
-            </a:pPr>
-            <a:r>
-              <a:rPr lang="en-US" altLang="zh-CN" dirty="0"/>
-              <a:t>ON </a:t>
-            </a:r>
-            <a:r>
-              <a:rPr lang="en-US" altLang="zh-CN" dirty="0" err="1"/>
-              <a:t>c.CustomerID</a:t>
-            </a:r>
-            <a:r>
-              <a:rPr lang="en-US" altLang="zh-CN" dirty="0"/>
-              <a:t> = </a:t>
-            </a:r>
-            <a:r>
-              <a:rPr lang="en-US" altLang="zh-CN" dirty="0" err="1"/>
-              <a:t>o.CustomerID</a:t>
-            </a:r>
-            <a:endParaRPr lang="en-US" altLang="zh-CN" dirty="0"/>
-          </a:p>
-          <a:p>
-            <a:pPr>
-              <a:lnSpc>
-                <a:spcPct val="100000"/>
-              </a:lnSpc>
-              <a:spcAft>
-                <a:spcPts val="0"/>
-              </a:spcAft>
-            </a:pPr>
-            <a:r>
-              <a:rPr lang="en-US" altLang="zh-CN" dirty="0"/>
-              <a:t>JOIN Employees e</a:t>
-            </a:r>
-          </a:p>
-          <a:p>
-            <a:pPr>
-              <a:lnSpc>
-                <a:spcPct val="100000"/>
-              </a:lnSpc>
-              <a:spcAft>
-                <a:spcPts val="0"/>
-              </a:spcAft>
-            </a:pPr>
-            <a:r>
-              <a:rPr lang="en-US" altLang="zh-CN" dirty="0"/>
-              <a:t>ON </a:t>
-            </a:r>
-            <a:r>
-              <a:rPr lang="en-US" altLang="zh-CN" dirty="0" err="1"/>
-              <a:t>e.EmployeeID</a:t>
-            </a:r>
-            <a:r>
-              <a:rPr lang="en-US" altLang="zh-CN" dirty="0"/>
-              <a:t> = </a:t>
-            </a:r>
-            <a:r>
-              <a:rPr lang="en-US" altLang="zh-CN" dirty="0" err="1"/>
-              <a:t>o.EmployeeID</a:t>
-            </a:r>
-            <a:endParaRPr lang="en-US" altLang="zh-CN" dirty="0"/>
-          </a:p>
-          <a:p>
-            <a:pPr>
-              <a:lnSpc>
-                <a:spcPct val="100000"/>
-              </a:lnSpc>
-              <a:spcAft>
-                <a:spcPts val="0"/>
-              </a:spcAft>
-            </a:pPr>
-            <a:r>
-              <a:rPr lang="en-US" altLang="zh-CN" dirty="0"/>
-              <a:t>GROUP BY </a:t>
-            </a:r>
-            <a:r>
-              <a:rPr lang="en-US" altLang="zh-CN" dirty="0" err="1"/>
-              <a:t>c.CompanyName</a:t>
-            </a:r>
-            <a:endParaRPr lang="en-US" altLang="zh-CN" dirty="0"/>
-          </a:p>
-          <a:p>
-            <a:pPr>
-              <a:lnSpc>
-                <a:spcPct val="100000"/>
-              </a:lnSpc>
-              <a:spcAft>
-                <a:spcPts val="0"/>
-              </a:spcAft>
-            </a:pPr>
-            <a:r>
-              <a:rPr lang="en-US" altLang="zh-CN" dirty="0"/>
-              <a:t>HAVING COUNT(</a:t>
-            </a:r>
-            <a:r>
-              <a:rPr lang="en-US" altLang="zh-CN" dirty="0" err="1"/>
-              <a:t>e.EmployeeID</a:t>
-            </a:r>
-            <a:r>
-              <a:rPr lang="en-US" altLang="zh-CN" dirty="0"/>
-              <a:t>) &gt; 15</a:t>
-            </a:r>
-          </a:p>
-          <a:p>
-            <a:pPr>
-              <a:lnSpc>
-                <a:spcPct val="100000"/>
-              </a:lnSpc>
-              <a:spcAft>
-                <a:spcPts val="0"/>
-              </a:spcAft>
-            </a:pPr>
-            <a:r>
-              <a:rPr lang="en-US" altLang="zh-CN" dirty="0"/>
-              <a:t>ORDER BY </a:t>
-            </a:r>
-            <a:r>
-              <a:rPr lang="en-US" altLang="zh-CN" dirty="0" err="1"/>
-              <a:t>EmployeesNum</a:t>
-            </a:r>
-            <a:endParaRPr lang="en-US" altLang="zh-CN" dirty="0"/>
-          </a:p>
-          <a:p>
-            <a:pPr>
-              <a:lnSpc>
-                <a:spcPct val="100000"/>
-              </a:lnSpc>
-              <a:spcAft>
-                <a:spcPts val="0"/>
-              </a:spcAft>
-            </a:pPr>
-            <a:r>
-              <a:rPr lang="en-US" altLang="zh-CN" dirty="0"/>
-              <a:t>DESC;</a:t>
-            </a:r>
           </a:p>
           <a:p>
             <a:pPr lvl="0" rtl="0">
@@ -42898,148 +39641,6 @@
             </a:endParaRPr>
           </a:p>
           <a:p>
-            <a:pPr>
-              <a:lnSpc>
-                <a:spcPct val="100000"/>
-              </a:lnSpc>
-              <a:spcAft>
-                <a:spcPts val="0"/>
-              </a:spcAft>
-            </a:pPr>
-            <a:r>
-              <a:rPr lang="en-US" altLang="zh-CN" dirty="0"/>
-              <a:t>SELECT </a:t>
-            </a:r>
-            <a:r>
-              <a:rPr lang="en-US" altLang="zh-CN" dirty="0" err="1"/>
-              <a:t>s.CompanyName</a:t>
-            </a:r>
-            <a:r>
-              <a:rPr lang="en-US" altLang="zh-CN" dirty="0"/>
-              <a:t>, COUNT(</a:t>
-            </a:r>
-            <a:r>
-              <a:rPr lang="en-US" altLang="zh-CN" dirty="0" err="1"/>
-              <a:t>p.CategoryID</a:t>
-            </a:r>
-            <a:r>
-              <a:rPr lang="en-US" altLang="zh-CN" dirty="0"/>
-              <a:t>) AS </a:t>
-            </a:r>
-            <a:r>
-              <a:rPr lang="en-US" altLang="zh-CN" dirty="0" err="1"/>
-              <a:t>CategoryNum</a:t>
-            </a:r>
-            <a:endParaRPr lang="en-US" altLang="zh-CN" dirty="0"/>
-          </a:p>
-          <a:p>
-            <a:pPr>
-              <a:lnSpc>
-                <a:spcPct val="100000"/>
-              </a:lnSpc>
-              <a:spcAft>
-                <a:spcPts val="0"/>
-              </a:spcAft>
-            </a:pPr>
-            <a:r>
-              <a:rPr lang="en-US" altLang="zh-CN" dirty="0"/>
-              <a:t>FROM Suppliers s</a:t>
-            </a:r>
-          </a:p>
-          <a:p>
-            <a:pPr>
-              <a:lnSpc>
-                <a:spcPct val="100000"/>
-              </a:lnSpc>
-              <a:spcAft>
-                <a:spcPts val="0"/>
-              </a:spcAft>
-            </a:pPr>
-            <a:r>
-              <a:rPr lang="en-US" altLang="zh-CN" dirty="0"/>
-              <a:t>JOIN Products p</a:t>
-            </a:r>
-          </a:p>
-          <a:p>
-            <a:pPr>
-              <a:lnSpc>
-                <a:spcPct val="100000"/>
-              </a:lnSpc>
-              <a:spcAft>
-                <a:spcPts val="0"/>
-              </a:spcAft>
-            </a:pPr>
-            <a:r>
-              <a:rPr lang="en-US" altLang="zh-CN" dirty="0"/>
-              <a:t>ON </a:t>
-            </a:r>
-            <a:r>
-              <a:rPr lang="en-US" altLang="zh-CN" dirty="0" err="1"/>
-              <a:t>s.SupplierID</a:t>
-            </a:r>
-            <a:r>
-              <a:rPr lang="en-US" altLang="zh-CN" dirty="0"/>
-              <a:t> = </a:t>
-            </a:r>
-            <a:r>
-              <a:rPr lang="en-US" altLang="zh-CN" dirty="0" err="1"/>
-              <a:t>p.SupplierID</a:t>
-            </a:r>
-            <a:endParaRPr lang="en-US" altLang="zh-CN" dirty="0"/>
-          </a:p>
-          <a:p>
-            <a:pPr>
-              <a:lnSpc>
-                <a:spcPct val="100000"/>
-              </a:lnSpc>
-              <a:spcAft>
-                <a:spcPts val="0"/>
-              </a:spcAft>
-            </a:pPr>
-            <a:r>
-              <a:rPr lang="en-US" altLang="zh-CN" dirty="0"/>
-              <a:t>GROUP BY </a:t>
-            </a:r>
-            <a:r>
-              <a:rPr lang="en-US" altLang="zh-CN" dirty="0" err="1"/>
-              <a:t>s.CompanyName</a:t>
-            </a:r>
-            <a:endParaRPr lang="en-US" altLang="zh-CN" dirty="0"/>
-          </a:p>
-          <a:p>
-            <a:pPr>
-              <a:lnSpc>
-                <a:spcPct val="100000"/>
-              </a:lnSpc>
-              <a:spcAft>
-                <a:spcPts val="0"/>
-              </a:spcAft>
-            </a:pPr>
-            <a:r>
-              <a:rPr lang="en-US" altLang="zh-CN" dirty="0"/>
-              <a:t>ORDER BY </a:t>
-            </a:r>
-            <a:r>
-              <a:rPr lang="en-US" altLang="zh-CN" dirty="0" err="1"/>
-              <a:t>CategoryNum</a:t>
-            </a:r>
-            <a:endParaRPr lang="en-US" altLang="zh-CN" dirty="0"/>
-          </a:p>
-          <a:p>
-            <a:pPr>
-              <a:lnSpc>
-                <a:spcPct val="100000"/>
-              </a:lnSpc>
-              <a:spcAft>
-                <a:spcPts val="0"/>
-              </a:spcAft>
-            </a:pPr>
-            <a:r>
-              <a:rPr lang="en-US" altLang="zh-CN" dirty="0"/>
-              <a:t>DESC;</a:t>
-            </a:r>
-          </a:p>
-          <a:p>
             <a:pPr lvl="0" rtl="0">
               <a:spcBef>
                 <a:spcPts val="0"/>
@@ -43321,230 +39922,6 @@
               <a:cs typeface="Open Sans"/>
               <a:sym typeface="Open Sans"/>
             </a:endParaRPr>
-          </a:p>
-          <a:p>
-            <a:pPr>
-              <a:lnSpc>
-                <a:spcPct val="100000"/>
-              </a:lnSpc>
-              <a:spcAft>
-                <a:spcPts val="0"/>
-              </a:spcAft>
-            </a:pPr>
-            <a:r>
-              <a:rPr lang="en-US" altLang="zh-CN" dirty="0"/>
-              <a:t>SELECT </a:t>
-            </a:r>
-            <a:r>
-              <a:rPr lang="en-US" altLang="zh-CN" dirty="0" err="1"/>
-              <a:t>s.CompanyName</a:t>
-            </a:r>
-            <a:r>
-              <a:rPr lang="en-US" altLang="zh-CN" dirty="0"/>
-              <a:t>, SUM(</a:t>
-            </a:r>
-            <a:r>
-              <a:rPr lang="en-US" altLang="zh-CN" dirty="0" err="1"/>
-              <a:t>od.UnitPrice</a:t>
-            </a:r>
-            <a:r>
-              <a:rPr lang="en-US" altLang="zh-CN" dirty="0"/>
-              <a:t> * </a:t>
-            </a:r>
-            <a:r>
-              <a:rPr lang="en-US" altLang="zh-CN" dirty="0" err="1"/>
-              <a:t>od.Quantity</a:t>
-            </a:r>
-            <a:r>
-              <a:rPr lang="en-US" altLang="zh-CN" dirty="0"/>
-              <a:t> * (1 - </a:t>
-            </a:r>
-            <a:r>
-              <a:rPr lang="en-US" altLang="zh-CN" dirty="0" err="1"/>
-              <a:t>od.Discount</a:t>
-            </a:r>
-            <a:r>
-              <a:rPr lang="en-US" altLang="zh-CN" dirty="0"/>
-              <a:t>)) AS </a:t>
-            </a:r>
-            <a:r>
-              <a:rPr lang="en-US" altLang="zh-CN" dirty="0" err="1"/>
-              <a:t>TotalCost</a:t>
-            </a:r>
-            <a:endParaRPr lang="en-US" altLang="zh-CN" dirty="0"/>
-          </a:p>
-          <a:p>
-            <a:pPr>
-              <a:lnSpc>
-                <a:spcPct val="100000"/>
-              </a:lnSpc>
-              <a:spcAft>
-                <a:spcPts val="0"/>
-              </a:spcAft>
-            </a:pPr>
-            <a:r>
-              <a:rPr lang="en-US" altLang="zh-CN" dirty="0"/>
-              <a:t>FROM Suppliers s</a:t>
-            </a:r>
-          </a:p>
-          <a:p>
-            <a:pPr>
-              <a:lnSpc>
-                <a:spcPct val="100000"/>
-              </a:lnSpc>
-              <a:spcAft>
-                <a:spcPts val="0"/>
-              </a:spcAft>
-            </a:pPr>
-            <a:r>
-              <a:rPr lang="en-US" altLang="zh-CN" dirty="0"/>
-              <a:t>JOIN Products p</a:t>
-            </a:r>
-          </a:p>
-          <a:p>
-            <a:pPr>
-              <a:lnSpc>
-                <a:spcPct val="100000"/>
-              </a:lnSpc>
-              <a:spcAft>
-                <a:spcPts val="0"/>
-              </a:spcAft>
-            </a:pPr>
-            <a:r>
-              <a:rPr lang="en-US" altLang="zh-CN" dirty="0"/>
-              <a:t>ON </a:t>
-            </a:r>
-            <a:r>
-              <a:rPr lang="en-US" altLang="zh-CN" dirty="0" err="1"/>
-              <a:t>s.SupplierID</a:t>
-            </a:r>
-            <a:r>
-              <a:rPr lang="en-US" altLang="zh-CN" dirty="0"/>
-              <a:t> = </a:t>
-            </a:r>
-            <a:r>
-              <a:rPr lang="en-US" altLang="zh-CN" dirty="0" err="1"/>
-              <a:t>p.SupplierID</a:t>
-            </a:r>
-            <a:endParaRPr lang="en-US" altLang="zh-CN" dirty="0"/>
-          </a:p>
-          <a:p>
-            <a:pPr>
-              <a:lnSpc>
-                <a:spcPct val="100000"/>
-              </a:lnSpc>
-              <a:spcAft>
-                <a:spcPts val="0"/>
-              </a:spcAft>
-            </a:pPr>
-            <a:r>
-              <a:rPr lang="en-US" altLang="zh-CN" dirty="0"/>
-              <a:t>JOIN </a:t>
-            </a:r>
-            <a:r>
-              <a:rPr lang="en-US" altLang="zh-CN" dirty="0" err="1"/>
-              <a:t>OrderDetails</a:t>
-            </a:r>
-            <a:r>
-              <a:rPr lang="en-US" altLang="zh-CN" dirty="0"/>
-              <a:t> od</a:t>
-            </a:r>
-          </a:p>
-          <a:p>
-            <a:pPr>
-              <a:lnSpc>
-                <a:spcPct val="100000"/>
-              </a:lnSpc>
-              <a:spcAft>
-                <a:spcPts val="0"/>
-              </a:spcAft>
-            </a:pPr>
-            <a:r>
-              <a:rPr lang="en-US" altLang="zh-CN" dirty="0"/>
-              <a:t>ON </a:t>
-            </a:r>
-            <a:r>
-              <a:rPr lang="en-US" altLang="zh-CN" dirty="0" err="1"/>
-              <a:t>od.ProductID</a:t>
-            </a:r>
-            <a:r>
-              <a:rPr lang="en-US" altLang="zh-CN" dirty="0"/>
-              <a:t> = </a:t>
-            </a:r>
-            <a:r>
-              <a:rPr lang="en-US" altLang="zh-CN" dirty="0" err="1"/>
-              <a:t>p.ProductID</a:t>
-            </a:r>
-            <a:endParaRPr lang="en-US" altLang="zh-CN" dirty="0"/>
-          </a:p>
-          <a:p>
-            <a:pPr>
-              <a:lnSpc>
-                <a:spcPct val="100000"/>
-              </a:lnSpc>
-              <a:spcAft>
-                <a:spcPts val="0"/>
-              </a:spcAft>
-            </a:pPr>
-            <a:r>
-              <a:rPr lang="en-US" altLang="zh-CN" dirty="0"/>
-              <a:t>GROUP BY </a:t>
-            </a:r>
-            <a:r>
-              <a:rPr lang="en-US" altLang="zh-CN" dirty="0" err="1"/>
-              <a:t>s.CompanyName</a:t>
-            </a:r>
-            <a:endParaRPr lang="en-US" altLang="zh-CN" dirty="0"/>
-          </a:p>
-          <a:p>
-            <a:pPr>
-              <a:lnSpc>
-                <a:spcPct val="100000"/>
-              </a:lnSpc>
-              <a:spcAft>
-                <a:spcPts val="0"/>
-              </a:spcAft>
-            </a:pPr>
-            <a:r>
-              <a:rPr lang="en-US" altLang="zh-CN" dirty="0"/>
-              <a:t>ORDER BY </a:t>
-            </a:r>
-            <a:r>
-              <a:rPr lang="en-US" altLang="zh-CN" dirty="0" err="1"/>
-              <a:t>TotalCost</a:t>
-            </a:r>
-            <a:r>
-              <a:rPr lang="en-US" altLang="zh-CN" dirty="0"/>
-              <a:t> </a:t>
-            </a:r>
-          </a:p>
-          <a:p>
-            <a:pPr>
-              <a:lnSpc>
-                <a:spcPct val="100000"/>
-              </a:lnSpc>
-              <a:spcAft>
-                <a:spcPts val="0"/>
-              </a:spcAft>
-            </a:pPr>
-            <a:r>
-              <a:rPr lang="en-US" altLang="zh-CN" dirty="0"/>
-              <a:t>DESC</a:t>
-            </a:r>
-          </a:p>
-          <a:p>
-            <a:pPr>
-              <a:lnSpc>
-                <a:spcPct val="100000"/>
-              </a:lnSpc>
-              <a:spcAft>
-                <a:spcPts val="0"/>
-              </a:spcAft>
-            </a:pPr>
-            <a:r>
-              <a:rPr lang="en-US" altLang="zh-CN" dirty="0"/>
-              <a:t>LIMIT 10;</a:t>
-            </a:r>
           </a:p>
           <a:p>
             <a:pPr lvl="0" rtl="0">
@@ -43882,608 +40259,6 @@
             </a:endParaRPr>
           </a:p>
           <a:p>
-            <a:pPr>
-              <a:lnSpc>
-                <a:spcPct val="100000"/>
-              </a:lnSpc>
-              <a:spcAft>
-                <a:spcPts val="0"/>
-              </a:spcAft>
-            </a:pPr>
-            <a:r>
-              <a:rPr lang="en-US" altLang="zh-CN" dirty="0"/>
-              <a:t>WITH </a:t>
-            </a:r>
-            <a:r>
-              <a:rPr lang="en-US" altLang="zh-CN" dirty="0" err="1"/>
-              <a:t>TopSuppliers</a:t>
-            </a:r>
-            <a:r>
-              <a:rPr lang="en-US" altLang="zh-CN" dirty="0"/>
-              <a:t> AS (SELECT </a:t>
-            </a:r>
-            <a:r>
-              <a:rPr lang="en-US" altLang="zh-CN" dirty="0" err="1"/>
-              <a:t>SupplierID</a:t>
-            </a:r>
-            <a:r>
-              <a:rPr lang="en-US" altLang="zh-CN" dirty="0"/>
-              <a:t> FROM (SELECT </a:t>
-            </a:r>
-            <a:r>
-              <a:rPr lang="en-US" altLang="zh-CN" dirty="0" err="1"/>
-              <a:t>s.SupplierID</a:t>
-            </a:r>
-            <a:r>
-              <a:rPr lang="en-US" altLang="zh-CN" dirty="0"/>
-              <a:t>, SUM(</a:t>
-            </a:r>
-            <a:r>
-              <a:rPr lang="en-US" altLang="zh-CN" dirty="0" err="1"/>
-              <a:t>od.UnitPrice</a:t>
-            </a:r>
-            <a:r>
-              <a:rPr lang="en-US" altLang="zh-CN" dirty="0"/>
-              <a:t> * </a:t>
-            </a:r>
-            <a:r>
-              <a:rPr lang="en-US" altLang="zh-CN" dirty="0" err="1"/>
-              <a:t>od.Quantity</a:t>
-            </a:r>
-            <a:r>
-              <a:rPr lang="en-US" altLang="zh-CN" dirty="0"/>
-              <a:t> * (1 - </a:t>
-            </a:r>
-            <a:r>
-              <a:rPr lang="en-US" altLang="zh-CN" dirty="0" err="1"/>
-              <a:t>od.Discount</a:t>
-            </a:r>
-            <a:r>
-              <a:rPr lang="en-US" altLang="zh-CN" dirty="0"/>
-              <a:t>)) AS </a:t>
-            </a:r>
-            <a:r>
-              <a:rPr lang="en-US" altLang="zh-CN" dirty="0" err="1"/>
-              <a:t>TotalCost</a:t>
-            </a:r>
-            <a:endParaRPr lang="en-US" altLang="zh-CN" dirty="0"/>
-          </a:p>
-          <a:p>
-            <a:pPr>
-              <a:lnSpc>
-                <a:spcPct val="100000"/>
-              </a:lnSpc>
-              <a:spcAft>
-                <a:spcPts val="0"/>
-              </a:spcAft>
-            </a:pPr>
-            <a:r>
-              <a:rPr lang="en-US" altLang="zh-CN" dirty="0"/>
-              <a:t>FROM Suppliers s</a:t>
-            </a:r>
-          </a:p>
-          <a:p>
-            <a:pPr>
-              <a:lnSpc>
-                <a:spcPct val="100000"/>
-              </a:lnSpc>
-              <a:spcAft>
-                <a:spcPts val="0"/>
-              </a:spcAft>
-            </a:pPr>
-            <a:r>
-              <a:rPr lang="en-US" altLang="zh-CN" dirty="0"/>
-              <a:t>JOIN Products p</a:t>
-            </a:r>
-          </a:p>
-          <a:p>
-            <a:pPr>
-              <a:lnSpc>
-                <a:spcPct val="100000"/>
-              </a:lnSpc>
-              <a:spcAft>
-                <a:spcPts val="0"/>
-              </a:spcAft>
-            </a:pPr>
-            <a:r>
-              <a:rPr lang="en-US" altLang="zh-CN" dirty="0"/>
-              <a:t>ON </a:t>
-            </a:r>
-            <a:r>
-              <a:rPr lang="en-US" altLang="zh-CN" dirty="0" err="1"/>
-              <a:t>s.SupplierID</a:t>
-            </a:r>
-            <a:r>
-              <a:rPr lang="en-US" altLang="zh-CN" dirty="0"/>
-              <a:t> = </a:t>
-            </a:r>
-            <a:r>
-              <a:rPr lang="en-US" altLang="zh-CN" dirty="0" err="1"/>
-              <a:t>p.SupplierID</a:t>
-            </a:r>
-            <a:endParaRPr lang="en-US" altLang="zh-CN" dirty="0"/>
-          </a:p>
-          <a:p>
-            <a:pPr>
-              <a:lnSpc>
-                <a:spcPct val="100000"/>
-              </a:lnSpc>
-              <a:spcAft>
-                <a:spcPts val="0"/>
-              </a:spcAft>
-            </a:pPr>
-            <a:r>
-              <a:rPr lang="en-US" altLang="zh-CN" dirty="0"/>
-              <a:t>JOIN </a:t>
-            </a:r>
-            <a:r>
-              <a:rPr lang="en-US" altLang="zh-CN" dirty="0" err="1"/>
-              <a:t>OrderDetails</a:t>
-            </a:r>
-            <a:r>
-              <a:rPr lang="en-US" altLang="zh-CN" dirty="0"/>
-              <a:t> od</a:t>
-            </a:r>
-          </a:p>
-          <a:p>
-            <a:pPr>
-              <a:lnSpc>
-                <a:spcPct val="100000"/>
-              </a:lnSpc>
-              <a:spcAft>
-                <a:spcPts val="0"/>
-              </a:spcAft>
-            </a:pPr>
-            <a:r>
-              <a:rPr lang="en-US" altLang="zh-CN" dirty="0"/>
-              <a:t>ON </a:t>
-            </a:r>
-            <a:r>
-              <a:rPr lang="en-US" altLang="zh-CN" dirty="0" err="1"/>
-              <a:t>od.ProductID</a:t>
-            </a:r>
-            <a:r>
-              <a:rPr lang="en-US" altLang="zh-CN" dirty="0"/>
-              <a:t> = </a:t>
-            </a:r>
-            <a:r>
-              <a:rPr lang="en-US" altLang="zh-CN" dirty="0" err="1"/>
-              <a:t>p.ProductID</a:t>
-            </a:r>
-            <a:endParaRPr lang="en-US" altLang="zh-CN" dirty="0"/>
-          </a:p>
-          <a:p>
-            <a:pPr>
-              <a:lnSpc>
-                <a:spcPct val="100000"/>
-              </a:lnSpc>
-              <a:spcAft>
-                <a:spcPts val="0"/>
-              </a:spcAft>
-            </a:pPr>
-            <a:r>
-              <a:rPr lang="en-US" altLang="zh-CN" dirty="0"/>
-              <a:t>GROUP BY </a:t>
-            </a:r>
-            <a:r>
-              <a:rPr lang="en-US" altLang="zh-CN" dirty="0" err="1"/>
-              <a:t>s.CompanyName</a:t>
-            </a:r>
-            <a:endParaRPr lang="en-US" altLang="zh-CN" dirty="0"/>
-          </a:p>
-          <a:p>
-            <a:pPr>
-              <a:lnSpc>
-                <a:spcPct val="100000"/>
-              </a:lnSpc>
-              <a:spcAft>
-                <a:spcPts val="0"/>
-              </a:spcAft>
-            </a:pPr>
-            <a:r>
-              <a:rPr lang="en-US" altLang="zh-CN" dirty="0"/>
-              <a:t>ORDER BY </a:t>
-            </a:r>
-            <a:r>
-              <a:rPr lang="en-US" altLang="zh-CN" dirty="0" err="1"/>
-              <a:t>TotalCost</a:t>
-            </a:r>
-            <a:r>
-              <a:rPr lang="en-US" altLang="zh-CN" dirty="0"/>
-              <a:t> </a:t>
-            </a:r>
-          </a:p>
-          <a:p>
-            <a:pPr>
-              <a:lnSpc>
-                <a:spcPct val="100000"/>
-              </a:lnSpc>
-              <a:spcAft>
-                <a:spcPts val="0"/>
-              </a:spcAft>
-            </a:pPr>
-            <a:r>
-              <a:rPr lang="en-US" altLang="zh-CN" dirty="0"/>
-              <a:t>DESC</a:t>
-            </a:r>
-          </a:p>
-          <a:p>
-            <a:pPr>
-              <a:lnSpc>
-                <a:spcPct val="100000"/>
-              </a:lnSpc>
-              <a:spcAft>
-                <a:spcPts val="0"/>
-              </a:spcAft>
-            </a:pPr>
-            <a:r>
-              <a:rPr lang="en-US" altLang="zh-CN" dirty="0"/>
-              <a:t>LIMIT 10) sub)</a:t>
-            </a:r>
-          </a:p>
-          <a:p>
-            <a:pPr>
-              <a:lnSpc>
-                <a:spcPct val="100000"/>
-              </a:lnSpc>
-              <a:spcAft>
-                <a:spcPts val="0"/>
-              </a:spcAft>
-            </a:pPr>
-            <a:br>
-              <a:rPr lang="en-US" altLang="zh-CN" dirty="0"/>
-            </a:br>
-            <a:r>
-              <a:rPr lang="en-US" altLang="zh-CN" dirty="0"/>
-              <a:t>SELECT </a:t>
-            </a:r>
-            <a:r>
-              <a:rPr lang="en-US" altLang="zh-CN" dirty="0" err="1"/>
-              <a:t>s.CompanyName</a:t>
-            </a:r>
-            <a:r>
-              <a:rPr lang="en-US" altLang="zh-CN" dirty="0"/>
-              <a:t>, </a:t>
-            </a:r>
-            <a:r>
-              <a:rPr lang="en-US" altLang="zh-CN" dirty="0" err="1"/>
-              <a:t>ct.CategoryName</a:t>
-            </a:r>
-            <a:r>
-              <a:rPr lang="en-US" altLang="zh-CN" dirty="0"/>
-              <a:t>, SUM(</a:t>
-            </a:r>
-            <a:r>
-              <a:rPr lang="en-US" altLang="zh-CN" dirty="0" err="1"/>
-              <a:t>od.UnitPrice</a:t>
-            </a:r>
-            <a:r>
-              <a:rPr lang="en-US" altLang="zh-CN" dirty="0"/>
-              <a:t> * </a:t>
-            </a:r>
-            <a:r>
-              <a:rPr lang="en-US" altLang="zh-CN" dirty="0" err="1"/>
-              <a:t>od.Quantity</a:t>
-            </a:r>
-            <a:r>
-              <a:rPr lang="en-US" altLang="zh-CN" dirty="0"/>
-              <a:t> * (1 - </a:t>
-            </a:r>
-            <a:r>
-              <a:rPr lang="en-US" altLang="zh-CN" dirty="0" err="1"/>
-              <a:t>od.Discount</a:t>
-            </a:r>
-            <a:r>
-              <a:rPr lang="en-US" altLang="zh-CN" dirty="0"/>
-              <a:t>)) AS </a:t>
-            </a:r>
-            <a:r>
-              <a:rPr lang="en-US" altLang="zh-CN" dirty="0" err="1"/>
-              <a:t>TotalCost</a:t>
-            </a:r>
-            <a:endParaRPr lang="en-US" altLang="zh-CN" dirty="0"/>
-          </a:p>
-          <a:p>
-            <a:pPr>
-              <a:lnSpc>
-                <a:spcPct val="100000"/>
-              </a:lnSpc>
-              <a:spcAft>
-                <a:spcPts val="0"/>
-              </a:spcAft>
-            </a:pPr>
-            <a:r>
-              <a:rPr lang="en-US" altLang="zh-CN" dirty="0"/>
-              <a:t>FROM Suppliers s</a:t>
-            </a:r>
-          </a:p>
-          <a:p>
-            <a:pPr>
-              <a:lnSpc>
-                <a:spcPct val="100000"/>
-              </a:lnSpc>
-              <a:spcAft>
-                <a:spcPts val="0"/>
-              </a:spcAft>
-            </a:pPr>
-            <a:r>
-              <a:rPr lang="en-US" altLang="zh-CN" dirty="0"/>
-              <a:t>JOIN Products p</a:t>
-            </a:r>
-          </a:p>
-          <a:p>
-            <a:pPr>
-              <a:lnSpc>
-                <a:spcPct val="100000"/>
-              </a:lnSpc>
-              <a:spcAft>
-                <a:spcPts val="0"/>
-              </a:spcAft>
-            </a:pPr>
-            <a:r>
-              <a:rPr lang="en-US" altLang="zh-CN" dirty="0"/>
-              <a:t>ON </a:t>
-            </a:r>
-            <a:r>
-              <a:rPr lang="en-US" altLang="zh-CN" dirty="0" err="1"/>
-              <a:t>s.SupplierID</a:t>
-            </a:r>
-            <a:r>
-              <a:rPr lang="en-US" altLang="zh-CN" dirty="0"/>
-              <a:t> = </a:t>
-            </a:r>
-            <a:r>
-              <a:rPr lang="en-US" altLang="zh-CN" dirty="0" err="1"/>
-              <a:t>p.SupplierID</a:t>
-            </a:r>
-            <a:endParaRPr lang="en-US" altLang="zh-CN" dirty="0"/>
-          </a:p>
-          <a:p>
-            <a:pPr>
-              <a:lnSpc>
-                <a:spcPct val="100000"/>
-              </a:lnSpc>
-              <a:spcAft>
-                <a:spcPts val="0"/>
-              </a:spcAft>
-            </a:pPr>
-            <a:r>
-              <a:rPr lang="en-US" altLang="zh-CN" dirty="0"/>
-              <a:t>JOIN </a:t>
-            </a:r>
-            <a:r>
-              <a:rPr lang="en-US" altLang="zh-CN" dirty="0" err="1"/>
-              <a:t>OrderDetails</a:t>
-            </a:r>
-            <a:r>
-              <a:rPr lang="en-US" altLang="zh-CN" dirty="0"/>
-              <a:t> od</a:t>
-            </a:r>
-          </a:p>
-          <a:p>
-            <a:pPr>
-              <a:lnSpc>
-                <a:spcPct val="100000"/>
-              </a:lnSpc>
-              <a:spcAft>
-                <a:spcPts val="0"/>
-              </a:spcAft>
-            </a:pPr>
-            <a:r>
-              <a:rPr lang="en-US" altLang="zh-CN" dirty="0"/>
-              <a:t>ON </a:t>
-            </a:r>
-            <a:r>
-              <a:rPr lang="en-US" altLang="zh-CN" dirty="0" err="1"/>
-              <a:t>od.ProductID</a:t>
-            </a:r>
-            <a:r>
-              <a:rPr lang="en-US" altLang="zh-CN" dirty="0"/>
-              <a:t> = </a:t>
-            </a:r>
-            <a:r>
-              <a:rPr lang="en-US" altLang="zh-CN" dirty="0" err="1"/>
-              <a:t>p.ProductID</a:t>
-            </a:r>
-            <a:endParaRPr lang="en-US" altLang="zh-CN" dirty="0"/>
-          </a:p>
-          <a:p>
-            <a:pPr>
-              <a:lnSpc>
-                <a:spcPct val="100000"/>
-              </a:lnSpc>
-              <a:spcAft>
-                <a:spcPts val="0"/>
-              </a:spcAft>
-            </a:pPr>
-            <a:r>
-              <a:rPr lang="en-US" altLang="zh-CN" dirty="0"/>
-              <a:t>JOIN Orders o</a:t>
-            </a:r>
-          </a:p>
-          <a:p>
-            <a:pPr>
-              <a:lnSpc>
-                <a:spcPct val="100000"/>
-              </a:lnSpc>
-              <a:spcAft>
-                <a:spcPts val="0"/>
-              </a:spcAft>
-            </a:pPr>
-            <a:r>
-              <a:rPr lang="en-US" altLang="zh-CN" dirty="0"/>
-              <a:t>ON </a:t>
-            </a:r>
-            <a:r>
-              <a:rPr lang="en-US" altLang="zh-CN" dirty="0" err="1"/>
-              <a:t>o.OrderId</a:t>
-            </a:r>
-            <a:r>
-              <a:rPr lang="en-US" altLang="zh-CN" dirty="0"/>
-              <a:t> = </a:t>
-            </a:r>
-            <a:r>
-              <a:rPr lang="en-US" altLang="zh-CN" dirty="0" err="1"/>
-              <a:t>od.OrderID</a:t>
-            </a:r>
-            <a:endParaRPr lang="en-US" altLang="zh-CN" dirty="0"/>
-          </a:p>
-          <a:p>
-            <a:pPr>
-              <a:lnSpc>
-                <a:spcPct val="100000"/>
-              </a:lnSpc>
-              <a:spcAft>
-                <a:spcPts val="0"/>
-              </a:spcAft>
-            </a:pPr>
-            <a:r>
-              <a:rPr lang="en-US" altLang="zh-CN" dirty="0"/>
-              <a:t>JOIN Categories </a:t>
-            </a:r>
-            <a:r>
-              <a:rPr lang="en-US" altLang="zh-CN" dirty="0" err="1"/>
-              <a:t>ct</a:t>
-            </a:r>
-            <a:endParaRPr lang="en-US" altLang="zh-CN" dirty="0"/>
-          </a:p>
-          <a:p>
-            <a:pPr>
-              <a:lnSpc>
-                <a:spcPct val="100000"/>
-              </a:lnSpc>
-              <a:spcAft>
-                <a:spcPts val="0"/>
-              </a:spcAft>
-            </a:pPr>
-            <a:r>
-              <a:rPr lang="en-US" altLang="zh-CN" dirty="0"/>
-              <a:t>ON </a:t>
-            </a:r>
-            <a:r>
-              <a:rPr lang="en-US" altLang="zh-CN" dirty="0" err="1"/>
-              <a:t>ct.CategoryID</a:t>
-            </a:r>
-            <a:r>
-              <a:rPr lang="en-US" altLang="zh-CN" dirty="0"/>
-              <a:t> = </a:t>
-            </a:r>
-            <a:r>
-              <a:rPr lang="en-US" altLang="zh-CN" dirty="0" err="1"/>
-              <a:t>p.CategoryID</a:t>
-            </a:r>
-            <a:endParaRPr lang="en-US" altLang="zh-CN" dirty="0"/>
-          </a:p>
-          <a:p>
-            <a:pPr>
-              <a:lnSpc>
-                <a:spcPct val="100000"/>
-              </a:lnSpc>
-              <a:spcAft>
-                <a:spcPts val="0"/>
-              </a:spcAft>
-            </a:pPr>
-            <a:r>
-              <a:rPr lang="en-US" altLang="zh-CN" dirty="0"/>
-              <a:t>JOIN </a:t>
-            </a:r>
-            <a:r>
-              <a:rPr lang="en-US" altLang="zh-CN" dirty="0" err="1"/>
-              <a:t>TopSuppliers</a:t>
-            </a:r>
-            <a:r>
-              <a:rPr lang="en-US" altLang="zh-CN" dirty="0"/>
-              <a:t> </a:t>
-            </a:r>
-            <a:r>
-              <a:rPr lang="en-US" altLang="zh-CN" dirty="0" err="1"/>
-              <a:t>ts</a:t>
-            </a:r>
-            <a:endParaRPr lang="en-US" altLang="zh-CN" dirty="0"/>
-          </a:p>
-          <a:p>
-            <a:pPr>
-              <a:lnSpc>
-                <a:spcPct val="100000"/>
-              </a:lnSpc>
-              <a:spcAft>
-                <a:spcPts val="0"/>
-              </a:spcAft>
-            </a:pPr>
-            <a:r>
-              <a:rPr lang="en-US" altLang="zh-CN" dirty="0"/>
-              <a:t>ON </a:t>
-            </a:r>
-            <a:r>
-              <a:rPr lang="en-US" altLang="zh-CN" dirty="0" err="1"/>
-              <a:t>ts.SupplierID</a:t>
-            </a:r>
-            <a:r>
-              <a:rPr lang="en-US" altLang="zh-CN" dirty="0"/>
-              <a:t> = </a:t>
-            </a:r>
-            <a:r>
-              <a:rPr lang="en-US" altLang="zh-CN" dirty="0" err="1"/>
-              <a:t>s.SupplierID</a:t>
-            </a:r>
-            <a:endParaRPr lang="en-US" altLang="zh-CN" dirty="0"/>
-          </a:p>
-          <a:p>
-            <a:pPr>
-              <a:lnSpc>
-                <a:spcPct val="100000"/>
-              </a:lnSpc>
-              <a:spcAft>
-                <a:spcPts val="0"/>
-              </a:spcAft>
-            </a:pPr>
-            <a:r>
-              <a:rPr lang="en-US" altLang="zh-CN" dirty="0"/>
-              <a:t>GROUP BY CompanyName, </a:t>
-            </a:r>
-            <a:r>
-              <a:rPr lang="en-US" altLang="zh-CN" dirty="0" err="1"/>
-              <a:t>CategoryName</a:t>
-            </a:r>
-            <a:endParaRPr lang="en-US" altLang="zh-CN" dirty="0"/>
-          </a:p>
-          <a:p>
-            <a:pPr>
-              <a:lnSpc>
-                <a:spcPct val="100000"/>
-              </a:lnSpc>
-              <a:spcAft>
-                <a:spcPts val="0"/>
-              </a:spcAft>
-            </a:pPr>
-            <a:r>
-              <a:rPr lang="en-US" altLang="zh-CN" dirty="0"/>
-              <a:t>ORDER BY CompanyName, </a:t>
-            </a:r>
-            <a:r>
-              <a:rPr lang="en-US" altLang="zh-CN" dirty="0" err="1"/>
-              <a:t>TotalCost</a:t>
-            </a:r>
-            <a:r>
-              <a:rPr lang="en-US" altLang="zh-CN" dirty="0"/>
-              <a:t> </a:t>
-            </a:r>
-          </a:p>
-          <a:p>
-            <a:pPr>
-              <a:lnSpc>
-                <a:spcPct val="100000"/>
-              </a:lnSpc>
-              <a:spcAft>
-                <a:spcPts val="0"/>
-              </a:spcAft>
-            </a:pPr>
-            <a:r>
-              <a:rPr lang="en-US" altLang="zh-CN" dirty="0"/>
-              <a:t>DESC;</a:t>
-            </a:r>
-          </a:p>
-          <a:p>
             <a:pPr lvl="0" rtl="0">
               <a:spcBef>
                 <a:spcPts val="0"/>
@@ -44783,187 +40558,6 @@
             </a:endParaRPr>
           </a:p>
           <a:p>
-            <a:pPr>
-              <a:lnSpc>
-                <a:spcPct val="100000"/>
-              </a:lnSpc>
-              <a:spcAft>
-                <a:spcPts val="0"/>
-              </a:spcAft>
-            </a:pPr>
-            <a:r>
-              <a:rPr lang="en-US" altLang="zh-CN" dirty="0"/>
-              <a:t>SELECT </a:t>
-            </a:r>
-            <a:r>
-              <a:rPr lang="en-US" altLang="zh-CN" dirty="0" err="1"/>
-              <a:t>s.CompanyName</a:t>
-            </a:r>
-            <a:r>
-              <a:rPr lang="en-US" altLang="zh-CN" dirty="0"/>
-              <a:t>, </a:t>
-            </a:r>
-            <a:r>
-              <a:rPr lang="en-US" altLang="zh-CN" dirty="0" err="1"/>
-              <a:t>c.CategoryName</a:t>
-            </a:r>
-            <a:r>
-              <a:rPr lang="en-US" altLang="zh-CN" dirty="0"/>
-              <a:t>, AVG(</a:t>
-            </a:r>
-            <a:r>
-              <a:rPr lang="en-US" altLang="zh-CN" dirty="0" err="1"/>
-              <a:t>UnitsOnOrder</a:t>
-            </a:r>
-            <a:r>
-              <a:rPr lang="en-US" altLang="zh-CN" dirty="0"/>
-              <a:t>) AS </a:t>
-            </a:r>
-            <a:r>
-              <a:rPr lang="en-US" altLang="zh-CN" dirty="0" err="1"/>
-              <a:t>avg_units_order</a:t>
-            </a:r>
-            <a:endParaRPr lang="en-US" altLang="zh-CN" dirty="0"/>
-          </a:p>
-          <a:p>
-            <a:pPr>
-              <a:lnSpc>
-                <a:spcPct val="100000"/>
-              </a:lnSpc>
-              <a:spcAft>
-                <a:spcPts val="0"/>
-              </a:spcAft>
-            </a:pPr>
-            <a:r>
-              <a:rPr lang="en-US" altLang="zh-CN" dirty="0"/>
-              <a:t>FROM Suppliers s</a:t>
-            </a:r>
-          </a:p>
-          <a:p>
-            <a:pPr>
-              <a:lnSpc>
-                <a:spcPct val="100000"/>
-              </a:lnSpc>
-              <a:spcAft>
-                <a:spcPts val="0"/>
-              </a:spcAft>
-            </a:pPr>
-            <a:r>
-              <a:rPr lang="en-US" altLang="zh-CN" dirty="0"/>
-              <a:t>JOIN Products p</a:t>
-            </a:r>
-          </a:p>
-          <a:p>
-            <a:pPr>
-              <a:lnSpc>
-                <a:spcPct val="100000"/>
-              </a:lnSpc>
-              <a:spcAft>
-                <a:spcPts val="0"/>
-              </a:spcAft>
-            </a:pPr>
-            <a:r>
-              <a:rPr lang="en-US" altLang="zh-CN" dirty="0"/>
-              <a:t>ON </a:t>
-            </a:r>
-            <a:r>
-              <a:rPr lang="en-US" altLang="zh-CN" dirty="0" err="1"/>
-              <a:t>s.SupplierID</a:t>
-            </a:r>
-            <a:r>
-              <a:rPr lang="en-US" altLang="zh-CN" dirty="0"/>
-              <a:t> = </a:t>
-            </a:r>
-            <a:r>
-              <a:rPr lang="en-US" altLang="zh-CN" dirty="0" err="1"/>
-              <a:t>p.SupplierID</a:t>
-            </a:r>
-            <a:endParaRPr lang="en-US" altLang="zh-CN" dirty="0"/>
-          </a:p>
-          <a:p>
-            <a:pPr>
-              <a:lnSpc>
-                <a:spcPct val="100000"/>
-              </a:lnSpc>
-              <a:spcAft>
-                <a:spcPts val="0"/>
-              </a:spcAft>
-            </a:pPr>
-            <a:r>
-              <a:rPr lang="en-US" altLang="zh-CN" dirty="0"/>
-              <a:t>JOIN Categories c</a:t>
-            </a:r>
-          </a:p>
-          <a:p>
-            <a:pPr>
-              <a:lnSpc>
-                <a:spcPct val="100000"/>
-              </a:lnSpc>
-              <a:spcAft>
-                <a:spcPts val="0"/>
-              </a:spcAft>
-            </a:pPr>
-            <a:r>
-              <a:rPr lang="en-US" altLang="zh-CN" dirty="0"/>
-              <a:t>ON </a:t>
-            </a:r>
-            <a:r>
-              <a:rPr lang="en-US" altLang="zh-CN" dirty="0" err="1"/>
-              <a:t>p.CategoryID</a:t>
-            </a:r>
-            <a:r>
-              <a:rPr lang="en-US" altLang="zh-CN" dirty="0"/>
-              <a:t> = </a:t>
-            </a:r>
-            <a:r>
-              <a:rPr lang="en-US" altLang="zh-CN" dirty="0" err="1"/>
-              <a:t>c.CategoryID</a:t>
-            </a:r>
-            <a:endParaRPr lang="en-US" altLang="zh-CN" dirty="0"/>
-          </a:p>
-          <a:p>
-            <a:pPr>
-              <a:lnSpc>
-                <a:spcPct val="100000"/>
-              </a:lnSpc>
-              <a:spcAft>
-                <a:spcPts val="0"/>
-              </a:spcAft>
-            </a:pPr>
-            <a:r>
-              <a:rPr lang="en-US" altLang="zh-CN" dirty="0"/>
-              <a:t>GROUP BY 1, 2</a:t>
-            </a:r>
-          </a:p>
-          <a:p>
-            <a:pPr>
-              <a:lnSpc>
-                <a:spcPct val="100000"/>
-              </a:lnSpc>
-              <a:spcAft>
-                <a:spcPts val="0"/>
-              </a:spcAft>
-            </a:pPr>
-            <a:r>
-              <a:rPr lang="en-US" altLang="zh-CN" dirty="0"/>
-              <a:t>ORDER BY 3 </a:t>
-            </a:r>
-          </a:p>
-          <a:p>
-            <a:pPr>
-              <a:lnSpc>
-                <a:spcPct val="100000"/>
-              </a:lnSpc>
-              <a:spcAft>
-                <a:spcPts val="0"/>
-              </a:spcAft>
-            </a:pPr>
-            <a:r>
-              <a:rPr lang="en-US" altLang="zh-CN" dirty="0"/>
-              <a:t>DESC;</a:t>
-            </a:r>
-          </a:p>
-          <a:p>
             <a:pPr lvl="0" rtl="0">
               <a:spcBef>
                 <a:spcPts val="0"/>
@@ -45227,206 +40821,6 @@
               <a:cs typeface="Open Sans"/>
               <a:sym typeface="Open Sans"/>
             </a:endParaRPr>
-          </a:p>
-          <a:p>
-            <a:pPr>
-              <a:lnSpc>
-                <a:spcPct val="100000"/>
-              </a:lnSpc>
-              <a:spcAft>
-                <a:spcPts val="0"/>
-              </a:spcAft>
-            </a:pPr>
-            <a:r>
-              <a:rPr lang="en-US" altLang="zh-CN" dirty="0"/>
-              <a:t>SELECT </a:t>
-            </a:r>
-            <a:r>
-              <a:rPr lang="en-US" altLang="zh-CN" dirty="0" err="1"/>
-              <a:t>p.ProductName</a:t>
-            </a:r>
-            <a:r>
-              <a:rPr lang="en-US" altLang="zh-CN" dirty="0"/>
-              <a:t>, COUNT(*) AS </a:t>
-            </a:r>
-            <a:r>
-              <a:rPr lang="en-US" altLang="zh-CN" dirty="0" err="1"/>
-              <a:t>ProductNum</a:t>
-            </a:r>
-            <a:endParaRPr lang="en-US" altLang="zh-CN" dirty="0"/>
-          </a:p>
-          <a:p>
-            <a:pPr>
-              <a:lnSpc>
-                <a:spcPct val="100000"/>
-              </a:lnSpc>
-              <a:spcAft>
-                <a:spcPts val="0"/>
-              </a:spcAft>
-            </a:pPr>
-            <a:r>
-              <a:rPr lang="en-US" altLang="zh-CN" dirty="0"/>
-              <a:t>FROM Orders o</a:t>
-            </a:r>
-          </a:p>
-          <a:p>
-            <a:pPr>
-              <a:lnSpc>
-                <a:spcPct val="100000"/>
-              </a:lnSpc>
-              <a:spcAft>
-                <a:spcPts val="0"/>
-              </a:spcAft>
-            </a:pPr>
-            <a:r>
-              <a:rPr lang="en-US" altLang="zh-CN" dirty="0"/>
-              <a:t>JOIN </a:t>
-            </a:r>
-            <a:r>
-              <a:rPr lang="en-US" altLang="zh-CN" dirty="0" err="1"/>
-              <a:t>OrderDetails</a:t>
-            </a:r>
-            <a:r>
-              <a:rPr lang="en-US" altLang="zh-CN" dirty="0"/>
-              <a:t> od</a:t>
-            </a:r>
-          </a:p>
-          <a:p>
-            <a:pPr>
-              <a:lnSpc>
-                <a:spcPct val="100000"/>
-              </a:lnSpc>
-              <a:spcAft>
-                <a:spcPts val="0"/>
-              </a:spcAft>
-            </a:pPr>
-            <a:r>
-              <a:rPr lang="en-US" altLang="zh-CN" dirty="0"/>
-              <a:t>ON </a:t>
-            </a:r>
-            <a:r>
-              <a:rPr lang="en-US" altLang="zh-CN" dirty="0" err="1"/>
-              <a:t>o.OrderId</a:t>
-            </a:r>
-            <a:r>
-              <a:rPr lang="en-US" altLang="zh-CN" dirty="0"/>
-              <a:t> = </a:t>
-            </a:r>
-            <a:r>
-              <a:rPr lang="en-US" altLang="zh-CN" dirty="0" err="1"/>
-              <a:t>od.OrderID</a:t>
-            </a:r>
-            <a:endParaRPr lang="en-US" altLang="zh-CN" dirty="0"/>
-          </a:p>
-          <a:p>
-            <a:pPr>
-              <a:lnSpc>
-                <a:spcPct val="100000"/>
-              </a:lnSpc>
-              <a:spcAft>
-                <a:spcPts val="0"/>
-              </a:spcAft>
-            </a:pPr>
-            <a:r>
-              <a:rPr lang="en-US" altLang="zh-CN" dirty="0"/>
-              <a:t>JOIN Products p</a:t>
-            </a:r>
-          </a:p>
-          <a:p>
-            <a:pPr>
-              <a:lnSpc>
-                <a:spcPct val="100000"/>
-              </a:lnSpc>
-              <a:spcAft>
-                <a:spcPts val="0"/>
-              </a:spcAft>
-            </a:pPr>
-            <a:r>
-              <a:rPr lang="en-US" altLang="zh-CN" dirty="0"/>
-              <a:t>ON </a:t>
-            </a:r>
-            <a:r>
-              <a:rPr lang="en-US" altLang="zh-CN" dirty="0" err="1"/>
-              <a:t>od.ProductID</a:t>
-            </a:r>
-            <a:r>
-              <a:rPr lang="en-US" altLang="zh-CN" dirty="0"/>
-              <a:t> = </a:t>
-            </a:r>
-            <a:r>
-              <a:rPr lang="en-US" altLang="zh-CN" dirty="0" err="1"/>
-              <a:t>p.ProductID</a:t>
-            </a:r>
-            <a:endParaRPr lang="en-US" altLang="zh-CN" dirty="0"/>
-          </a:p>
-          <a:p>
-            <a:pPr>
-              <a:lnSpc>
-                <a:spcPct val="100000"/>
-              </a:lnSpc>
-              <a:spcAft>
-                <a:spcPts val="0"/>
-              </a:spcAft>
-            </a:pPr>
-            <a:r>
-              <a:rPr lang="en-US" altLang="zh-CN" dirty="0"/>
-              <a:t>GROUP BY </a:t>
-            </a:r>
-            <a:r>
-              <a:rPr lang="en-US" altLang="zh-CN" dirty="0" err="1"/>
-              <a:t>p.ProductName</a:t>
-            </a:r>
-            <a:endParaRPr lang="en-US" altLang="zh-CN" dirty="0"/>
-          </a:p>
-          <a:p>
-            <a:pPr>
-              <a:lnSpc>
-                <a:spcPct val="100000"/>
-              </a:lnSpc>
-              <a:spcAft>
-                <a:spcPts val="0"/>
-              </a:spcAft>
-            </a:pPr>
-            <a:r>
-              <a:rPr lang="en-US" altLang="zh-CN" dirty="0"/>
-              <a:t>ORDER BY </a:t>
-            </a:r>
-            <a:r>
-              <a:rPr lang="en-US" altLang="zh-CN" dirty="0" err="1"/>
-              <a:t>ProductNum</a:t>
-            </a:r>
-            <a:r>
-              <a:rPr lang="en-US" altLang="zh-CN" dirty="0"/>
-              <a:t> </a:t>
-            </a:r>
-          </a:p>
-          <a:p>
-            <a:pPr>
-              <a:lnSpc>
-                <a:spcPct val="100000"/>
-              </a:lnSpc>
-              <a:spcAft>
-                <a:spcPts val="0"/>
-              </a:spcAft>
-            </a:pPr>
-            <a:r>
-              <a:rPr lang="en-US" altLang="zh-CN" dirty="0"/>
-              <a:t>DESC </a:t>
-            </a:r>
-          </a:p>
-          <a:p>
-            <a:pPr>
-              <a:lnSpc>
-                <a:spcPct val="100000"/>
-              </a:lnSpc>
-              <a:spcAft>
-                <a:spcPts val="0"/>
-              </a:spcAft>
-            </a:pPr>
-            <a:r>
-              <a:rPr lang="en-US" altLang="zh-CN" dirty="0"/>
-              <a:t>LIMIT 10;</a:t>
-            </a:r>
           </a:p>
           <a:p>
             <a:pPr lvl="0" rtl="0">

</xml_diff>